<commit_message>
Flee method finished. Adding name to char is made..
</commit_message>
<xml_diff>
--- a/Præsentations guf.pptx
+++ b/Præsentations guf.pptx
@@ -7,8 +7,19 @@
   <p:sldIdLst>
     <p:sldId id="256" r:id="rId2"/>
     <p:sldId id="257" r:id="rId3"/>
-    <p:sldId id="258" r:id="rId4"/>
-    <p:sldId id="259" r:id="rId5"/>
+    <p:sldId id="269" r:id="rId4"/>
+    <p:sldId id="260" r:id="rId5"/>
+    <p:sldId id="262" r:id="rId6"/>
+    <p:sldId id="263" r:id="rId7"/>
+    <p:sldId id="264" r:id="rId8"/>
+    <p:sldId id="265" r:id="rId9"/>
+    <p:sldId id="266" r:id="rId10"/>
+    <p:sldId id="267" r:id="rId11"/>
+    <p:sldId id="268" r:id="rId12"/>
+    <p:sldId id="270" r:id="rId13"/>
+    <p:sldId id="258" r:id="rId14"/>
+    <p:sldId id="259" r:id="rId15"/>
+    <p:sldId id="271" r:id="rId16"/>
   </p:sldIdLst>
   <p:sldSz cx="9144000" cy="6858000" type="screen4x3"/>
   <p:notesSz cx="6858000" cy="9144000"/>
@@ -291,7 +302,7 @@
           <a:p>
             <a:fld id="{EDC5A5AF-D9E8-4DD6-999F-A60663D43858}" type="datetimeFigureOut">
               <a:rPr lang="da-DK" smtClean="0"/>
-              <a:t>21-01-2013</a:t>
+              <a:t>22-01-2013</a:t>
             </a:fld>
             <a:endParaRPr lang="da-DK"/>
           </a:p>
@@ -456,7 +467,7 @@
           <a:p>
             <a:fld id="{EDC5A5AF-D9E8-4DD6-999F-A60663D43858}" type="datetimeFigureOut">
               <a:rPr lang="da-DK" smtClean="0"/>
-              <a:t>21-01-2013</a:t>
+              <a:t>22-01-2013</a:t>
             </a:fld>
             <a:endParaRPr lang="da-DK"/>
           </a:p>
@@ -631,7 +642,7 @@
           <a:p>
             <a:fld id="{EDC5A5AF-D9E8-4DD6-999F-A60663D43858}" type="datetimeFigureOut">
               <a:rPr lang="da-DK" smtClean="0"/>
-              <a:t>21-01-2013</a:t>
+              <a:t>22-01-2013</a:t>
             </a:fld>
             <a:endParaRPr lang="da-DK"/>
           </a:p>
@@ -796,7 +807,7 @@
           <a:p>
             <a:fld id="{EDC5A5AF-D9E8-4DD6-999F-A60663D43858}" type="datetimeFigureOut">
               <a:rPr lang="da-DK" smtClean="0"/>
-              <a:t>21-01-2013</a:t>
+              <a:t>22-01-2013</a:t>
             </a:fld>
             <a:endParaRPr lang="da-DK"/>
           </a:p>
@@ -1037,7 +1048,7 @@
           <a:p>
             <a:fld id="{EDC5A5AF-D9E8-4DD6-999F-A60663D43858}" type="datetimeFigureOut">
               <a:rPr lang="da-DK" smtClean="0"/>
-              <a:t>21-01-2013</a:t>
+              <a:t>22-01-2013</a:t>
             </a:fld>
             <a:endParaRPr lang="da-DK"/>
           </a:p>
@@ -1320,7 +1331,7 @@
           <a:p>
             <a:fld id="{EDC5A5AF-D9E8-4DD6-999F-A60663D43858}" type="datetimeFigureOut">
               <a:rPr lang="da-DK" smtClean="0"/>
-              <a:t>21-01-2013</a:t>
+              <a:t>22-01-2013</a:t>
             </a:fld>
             <a:endParaRPr lang="da-DK"/>
           </a:p>
@@ -1737,7 +1748,7 @@
           <a:p>
             <a:fld id="{EDC5A5AF-D9E8-4DD6-999F-A60663D43858}" type="datetimeFigureOut">
               <a:rPr lang="da-DK" smtClean="0"/>
-              <a:t>21-01-2013</a:t>
+              <a:t>22-01-2013</a:t>
             </a:fld>
             <a:endParaRPr lang="da-DK"/>
           </a:p>
@@ -1850,7 +1861,7 @@
           <a:p>
             <a:fld id="{EDC5A5AF-D9E8-4DD6-999F-A60663D43858}" type="datetimeFigureOut">
               <a:rPr lang="da-DK" smtClean="0"/>
-              <a:t>21-01-2013</a:t>
+              <a:t>22-01-2013</a:t>
             </a:fld>
             <a:endParaRPr lang="da-DK"/>
           </a:p>
@@ -1940,7 +1951,7 @@
           <a:p>
             <a:fld id="{EDC5A5AF-D9E8-4DD6-999F-A60663D43858}" type="datetimeFigureOut">
               <a:rPr lang="da-DK" smtClean="0"/>
-              <a:t>21-01-2013</a:t>
+              <a:t>22-01-2013</a:t>
             </a:fld>
             <a:endParaRPr lang="da-DK"/>
           </a:p>
@@ -2212,7 +2223,7 @@
           <a:p>
             <a:fld id="{EDC5A5AF-D9E8-4DD6-999F-A60663D43858}" type="datetimeFigureOut">
               <a:rPr lang="da-DK" smtClean="0"/>
-              <a:t>21-01-2013</a:t>
+              <a:t>22-01-2013</a:t>
             </a:fld>
             <a:endParaRPr lang="da-DK"/>
           </a:p>
@@ -2460,7 +2471,7 @@
           <a:p>
             <a:fld id="{EDC5A5AF-D9E8-4DD6-999F-A60663D43858}" type="datetimeFigureOut">
               <a:rPr lang="da-DK" smtClean="0"/>
-              <a:t>21-01-2013</a:t>
+              <a:t>22-01-2013</a:t>
             </a:fld>
             <a:endParaRPr lang="da-DK"/>
           </a:p>
@@ -2564,10 +2575,10 @@
           <a:lstStyle/>
           <a:p>
             <a:r>
-              <a:rPr lang="da-DK" smtClean="0"/>
+              <a:rPr lang="da-DK" dirty="0" smtClean="0"/>
               <a:t>Klik for at redigere titeltypografi i masteren</a:t>
             </a:r>
-            <a:endParaRPr lang="da-DK"/>
+            <a:endParaRPr lang="da-DK" dirty="0"/>
           </a:p>
         </p:txBody>
       </p:sp>
@@ -2598,38 +2609,38 @@
           <a:p>
             <a:pPr lvl="0"/>
             <a:r>
-              <a:rPr lang="da-DK" smtClean="0"/>
+              <a:rPr lang="da-DK" dirty="0" smtClean="0"/>
               <a:t>Klik for at redigere typografi i masteren</a:t>
             </a:r>
           </a:p>
           <a:p>
             <a:pPr lvl="1"/>
             <a:r>
-              <a:rPr lang="da-DK" smtClean="0"/>
+              <a:rPr lang="da-DK" dirty="0" smtClean="0"/>
               <a:t>Andet niveau</a:t>
             </a:r>
           </a:p>
           <a:p>
             <a:pPr lvl="2"/>
             <a:r>
-              <a:rPr lang="da-DK" smtClean="0"/>
+              <a:rPr lang="da-DK" dirty="0" smtClean="0"/>
               <a:t>Tredje niveau</a:t>
             </a:r>
           </a:p>
           <a:p>
             <a:pPr lvl="3"/>
             <a:r>
-              <a:rPr lang="da-DK" smtClean="0"/>
+              <a:rPr lang="da-DK" dirty="0" smtClean="0"/>
               <a:t>Fjerde niveau</a:t>
             </a:r>
           </a:p>
           <a:p>
             <a:pPr lvl="4"/>
             <a:r>
-              <a:rPr lang="da-DK" smtClean="0"/>
+              <a:rPr lang="da-DK" dirty="0" smtClean="0"/>
               <a:t>Femte niveau</a:t>
             </a:r>
-            <a:endParaRPr lang="da-DK"/>
+            <a:endParaRPr lang="da-DK" dirty="0"/>
           </a:p>
         </p:txBody>
       </p:sp>
@@ -2668,7 +2679,7 @@
           <a:p>
             <a:fld id="{EDC5A5AF-D9E8-4DD6-999F-A60663D43858}" type="datetimeFigureOut">
               <a:rPr lang="da-DK" smtClean="0"/>
-              <a:t>21-01-2013</a:t>
+              <a:t>22-01-2013</a:t>
             </a:fld>
             <a:endParaRPr lang="da-DK"/>
           </a:p>
@@ -2779,9 +2790,9 @@
           <a:solidFill>
             <a:schemeClr val="tx1"/>
           </a:solidFill>
-          <a:latin typeface="+mj-lt"/>
+          <a:latin typeface="Courier New" pitchFamily="49" charset="0"/>
           <a:ea typeface="+mj-ea"/>
-          <a:cs typeface="+mj-cs"/>
+          <a:cs typeface="Courier New" pitchFamily="49" charset="0"/>
         </a:defRPr>
       </a:lvl1pPr>
     </p:titleStyle>
@@ -2796,9 +2807,9 @@
           <a:solidFill>
             <a:schemeClr val="tx1"/>
           </a:solidFill>
-          <a:latin typeface="+mn-lt"/>
+          <a:latin typeface="Courier New" pitchFamily="49" charset="0"/>
           <a:ea typeface="+mn-ea"/>
-          <a:cs typeface="+mn-cs"/>
+          <a:cs typeface="Courier New" pitchFamily="49" charset="0"/>
         </a:defRPr>
       </a:lvl1pPr>
       <a:lvl2pPr marL="742950" indent="-285750" algn="l" defTabSz="914400" rtl="0" eaLnBrk="1" latinLnBrk="0" hangingPunct="1">
@@ -2811,9 +2822,9 @@
           <a:solidFill>
             <a:schemeClr val="tx1"/>
           </a:solidFill>
-          <a:latin typeface="+mn-lt"/>
+          <a:latin typeface="Courier New" pitchFamily="49" charset="0"/>
           <a:ea typeface="+mn-ea"/>
-          <a:cs typeface="+mn-cs"/>
+          <a:cs typeface="Courier New" pitchFamily="49" charset="0"/>
         </a:defRPr>
       </a:lvl2pPr>
       <a:lvl3pPr marL="1143000" indent="-228600" algn="l" defTabSz="914400" rtl="0" eaLnBrk="1" latinLnBrk="0" hangingPunct="1">
@@ -2826,9 +2837,9 @@
           <a:solidFill>
             <a:schemeClr val="tx1"/>
           </a:solidFill>
-          <a:latin typeface="+mn-lt"/>
+          <a:latin typeface="Courier New" pitchFamily="49" charset="0"/>
           <a:ea typeface="+mn-ea"/>
-          <a:cs typeface="+mn-cs"/>
+          <a:cs typeface="Courier New" pitchFamily="49" charset="0"/>
         </a:defRPr>
       </a:lvl3pPr>
       <a:lvl4pPr marL="1600200" indent="-228600" algn="l" defTabSz="914400" rtl="0" eaLnBrk="1" latinLnBrk="0" hangingPunct="1">
@@ -2841,9 +2852,9 @@
           <a:solidFill>
             <a:schemeClr val="tx1"/>
           </a:solidFill>
-          <a:latin typeface="+mn-lt"/>
+          <a:latin typeface="Courier New" pitchFamily="49" charset="0"/>
           <a:ea typeface="+mn-ea"/>
-          <a:cs typeface="+mn-cs"/>
+          <a:cs typeface="Courier New" pitchFamily="49" charset="0"/>
         </a:defRPr>
       </a:lvl4pPr>
       <a:lvl5pPr marL="2057400" indent="-228600" algn="l" defTabSz="914400" rtl="0" eaLnBrk="1" latinLnBrk="0" hangingPunct="1">
@@ -2856,9 +2867,9 @@
           <a:solidFill>
             <a:schemeClr val="tx1"/>
           </a:solidFill>
-          <a:latin typeface="+mn-lt"/>
+          <a:latin typeface="Courier New" pitchFamily="49" charset="0"/>
           <a:ea typeface="+mn-ea"/>
-          <a:cs typeface="+mn-cs"/>
+          <a:cs typeface="Courier New" pitchFamily="49" charset="0"/>
         </a:defRPr>
       </a:lvl5pPr>
       <a:lvl6pPr marL="2514600" indent="-228600" algn="l" defTabSz="914400" rtl="0" eaLnBrk="1" latinLnBrk="0" hangingPunct="1">
@@ -3103,6 +3114,949 @@
 </p:sld>
 </file>
 
+<file path=ppt/slides/slide10.xml><?xml version="1.0" encoding="utf-8"?>
+<p:sld xmlns:a="http://schemas.openxmlformats.org/drawingml/2006/main" xmlns:r="http://schemas.openxmlformats.org/officeDocument/2006/relationships" xmlns:p="http://schemas.openxmlformats.org/presentationml/2006/main">
+  <p:cSld>
+    <p:spTree>
+      <p:nvGrpSpPr>
+        <p:cNvPr id="1" name=""/>
+        <p:cNvGrpSpPr/>
+        <p:nvPr/>
+      </p:nvGrpSpPr>
+      <p:grpSpPr>
+        <a:xfrm>
+          <a:off x="0" y="0"/>
+          <a:ext cx="0" cy="0"/>
+          <a:chOff x="0" y="0"/>
+          <a:chExt cx="0" cy="0"/>
+        </a:xfrm>
+      </p:grpSpPr>
+      <p:sp>
+        <p:nvSpPr>
+          <p:cNvPr id="2" name="Titel 1"/>
+          <p:cNvSpPr>
+            <a:spLocks noGrp="1"/>
+          </p:cNvSpPr>
+          <p:nvPr>
+            <p:ph type="title"/>
+          </p:nvPr>
+        </p:nvSpPr>
+        <p:spPr/>
+        <p:txBody>
+          <a:bodyPr/>
+          <a:lstStyle/>
+          <a:p>
+            <a:r>
+              <a:rPr lang="da-DK" dirty="0" smtClean="0"/>
+              <a:t>Kommandoer</a:t>
+            </a:r>
+            <a:endParaRPr lang="da-DK" dirty="0"/>
+          </a:p>
+        </p:txBody>
+      </p:sp>
+      <p:sp>
+        <p:nvSpPr>
+          <p:cNvPr id="3" name="Pladsholder til indhold 2"/>
+          <p:cNvSpPr>
+            <a:spLocks noGrp="1"/>
+          </p:cNvSpPr>
+          <p:nvPr>
+            <p:ph idx="1"/>
+          </p:nvPr>
+        </p:nvSpPr>
+        <p:spPr/>
+        <p:txBody>
+          <a:bodyPr>
+            <a:normAutofit/>
+          </a:bodyPr>
+          <a:lstStyle/>
+          <a:p>
+            <a:r>
+              <a:rPr lang="da-DK" dirty="0" smtClean="0"/>
+              <a:t>Inventory</a:t>
+            </a:r>
+          </a:p>
+        </p:txBody>
+      </p:sp>
+      <p:pic>
+        <p:nvPicPr>
+          <p:cNvPr id="8197" name="Picture 5" descr="C:\Users\THL\Dropbox\Ting\inventory.png"/>
+          <p:cNvPicPr>
+            <a:picLocks noChangeAspect="1" noChangeArrowheads="1"/>
+          </p:cNvPicPr>
+          <p:nvPr/>
+        </p:nvPicPr>
+        <p:blipFill>
+          <a:blip r:embed="rId2">
+            <a:extLst>
+              <a:ext uri="{28A0092B-C50C-407E-A947-70E740481C1C}">
+                <a14:useLocalDpi xmlns:a14="http://schemas.microsoft.com/office/drawing/2010/main" val="0"/>
+              </a:ext>
+            </a:extLst>
+          </a:blip>
+          <a:srcRect/>
+          <a:stretch>
+            <a:fillRect/>
+          </a:stretch>
+        </p:blipFill>
+        <p:spPr bwMode="auto">
+          <a:xfrm>
+            <a:off x="1475656" y="2536166"/>
+            <a:ext cx="6450013" cy="3267075"/>
+          </a:xfrm>
+          <a:prstGeom prst="rect">
+            <a:avLst/>
+          </a:prstGeom>
+          <a:noFill/>
+          <a:extLst>
+            <a:ext uri="{909E8E84-426E-40DD-AFC4-6F175D3DCCD1}">
+              <a14:hiddenFill xmlns:a14="http://schemas.microsoft.com/office/drawing/2010/main">
+                <a:solidFill>
+                  <a:srgbClr val="FFFFFF"/>
+                </a:solidFill>
+              </a14:hiddenFill>
+            </a:ext>
+          </a:extLst>
+        </p:spPr>
+      </p:pic>
+    </p:spTree>
+    <p:extLst>
+      <p:ext uri="{BB962C8B-B14F-4D97-AF65-F5344CB8AC3E}">
+        <p14:creationId xmlns:p14="http://schemas.microsoft.com/office/powerpoint/2010/main" val="1410926937"/>
+      </p:ext>
+    </p:extLst>
+  </p:cSld>
+  <p:clrMapOvr>
+    <a:masterClrMapping/>
+  </p:clrMapOvr>
+</p:sld>
+</file>
+
+<file path=ppt/slides/slide11.xml><?xml version="1.0" encoding="utf-8"?>
+<p:sld xmlns:a="http://schemas.openxmlformats.org/drawingml/2006/main" xmlns:r="http://schemas.openxmlformats.org/officeDocument/2006/relationships" xmlns:p="http://schemas.openxmlformats.org/presentationml/2006/main">
+  <p:cSld>
+    <p:spTree>
+      <p:nvGrpSpPr>
+        <p:cNvPr id="1" name=""/>
+        <p:cNvGrpSpPr/>
+        <p:nvPr/>
+      </p:nvGrpSpPr>
+      <p:grpSpPr>
+        <a:xfrm>
+          <a:off x="0" y="0"/>
+          <a:ext cx="0" cy="0"/>
+          <a:chOff x="0" y="0"/>
+          <a:chExt cx="0" cy="0"/>
+        </a:xfrm>
+      </p:grpSpPr>
+      <p:sp>
+        <p:nvSpPr>
+          <p:cNvPr id="2" name="Titel 1"/>
+          <p:cNvSpPr>
+            <a:spLocks noGrp="1"/>
+          </p:cNvSpPr>
+          <p:nvPr>
+            <p:ph type="title"/>
+          </p:nvPr>
+        </p:nvSpPr>
+        <p:spPr/>
+        <p:txBody>
+          <a:bodyPr/>
+          <a:lstStyle/>
+          <a:p>
+            <a:r>
+              <a:rPr lang="da-DK" dirty="0" smtClean="0">
+                <a:latin typeface="Courier New" pitchFamily="49" charset="0"/>
+                <a:cs typeface="Courier New" pitchFamily="49" charset="0"/>
+              </a:rPr>
+              <a:t>Kommandoer</a:t>
+            </a:r>
+            <a:endParaRPr lang="da-DK" dirty="0">
+              <a:latin typeface="Courier New" pitchFamily="49" charset="0"/>
+              <a:cs typeface="Courier New" pitchFamily="49" charset="0"/>
+            </a:endParaRPr>
+          </a:p>
+        </p:txBody>
+      </p:sp>
+      <p:sp>
+        <p:nvSpPr>
+          <p:cNvPr id="3" name="Pladsholder til indhold 2"/>
+          <p:cNvSpPr>
+            <a:spLocks noGrp="1"/>
+          </p:cNvSpPr>
+          <p:nvPr>
+            <p:ph idx="1"/>
+          </p:nvPr>
+        </p:nvSpPr>
+        <p:spPr/>
+        <p:txBody>
+          <a:bodyPr>
+            <a:normAutofit/>
+          </a:bodyPr>
+          <a:lstStyle/>
+          <a:p>
+            <a:r>
+              <a:rPr lang="da-DK" dirty="0" smtClean="0">
+                <a:latin typeface="Courier New" pitchFamily="49" charset="0"/>
+                <a:cs typeface="Courier New" pitchFamily="49" charset="0"/>
+              </a:rPr>
+              <a:t>Savegame</a:t>
+            </a:r>
+          </a:p>
+          <a:p>
+            <a:pPr lvl="1"/>
+            <a:endParaRPr lang="da-DK" dirty="0" smtClean="0"/>
+          </a:p>
+        </p:txBody>
+      </p:sp>
+      <p:pic>
+        <p:nvPicPr>
+          <p:cNvPr id="9218" name="Picture 2" descr="C:\Users\THL\Dropbox\Ting\savegame.png"/>
+          <p:cNvPicPr>
+            <a:picLocks noChangeAspect="1" noChangeArrowheads="1"/>
+          </p:cNvPicPr>
+          <p:nvPr/>
+        </p:nvPicPr>
+        <p:blipFill>
+          <a:blip r:embed="rId2">
+            <a:extLst>
+              <a:ext uri="{28A0092B-C50C-407E-A947-70E740481C1C}">
+                <a14:useLocalDpi xmlns:a14="http://schemas.microsoft.com/office/drawing/2010/main" val="0"/>
+              </a:ext>
+            </a:extLst>
+          </a:blip>
+          <a:srcRect/>
+          <a:stretch>
+            <a:fillRect/>
+          </a:stretch>
+        </p:blipFill>
+        <p:spPr bwMode="auto">
+          <a:xfrm>
+            <a:off x="1547664" y="2491971"/>
+            <a:ext cx="6450013" cy="3267075"/>
+          </a:xfrm>
+          <a:prstGeom prst="rect">
+            <a:avLst/>
+          </a:prstGeom>
+          <a:noFill/>
+          <a:extLst>
+            <a:ext uri="{909E8E84-426E-40DD-AFC4-6F175D3DCCD1}">
+              <a14:hiddenFill xmlns:a14="http://schemas.microsoft.com/office/drawing/2010/main">
+                <a:solidFill>
+                  <a:srgbClr val="FFFFFF"/>
+                </a:solidFill>
+              </a14:hiddenFill>
+            </a:ext>
+          </a:extLst>
+        </p:spPr>
+      </p:pic>
+    </p:spTree>
+    <p:extLst>
+      <p:ext uri="{BB962C8B-B14F-4D97-AF65-F5344CB8AC3E}">
+        <p14:creationId xmlns:p14="http://schemas.microsoft.com/office/powerpoint/2010/main" val="1984804173"/>
+      </p:ext>
+    </p:extLst>
+  </p:cSld>
+  <p:clrMapOvr>
+    <a:masterClrMapping/>
+  </p:clrMapOvr>
+</p:sld>
+</file>
+
+<file path=ppt/slides/slide12.xml><?xml version="1.0" encoding="utf-8"?>
+<p:sld xmlns:a="http://schemas.openxmlformats.org/drawingml/2006/main" xmlns:r="http://schemas.openxmlformats.org/officeDocument/2006/relationships" xmlns:p="http://schemas.openxmlformats.org/presentationml/2006/main">
+  <p:cSld>
+    <p:spTree>
+      <p:nvGrpSpPr>
+        <p:cNvPr id="1" name=""/>
+        <p:cNvGrpSpPr/>
+        <p:nvPr/>
+      </p:nvGrpSpPr>
+      <p:grpSpPr>
+        <a:xfrm>
+          <a:off x="0" y="0"/>
+          <a:ext cx="0" cy="0"/>
+          <a:chOff x="0" y="0"/>
+          <a:chExt cx="0" cy="0"/>
+        </a:xfrm>
+      </p:grpSpPr>
+      <p:sp>
+        <p:nvSpPr>
+          <p:cNvPr id="2" name="Titel 1"/>
+          <p:cNvSpPr>
+            <a:spLocks noGrp="1"/>
+          </p:cNvSpPr>
+          <p:nvPr>
+            <p:ph type="title"/>
+          </p:nvPr>
+        </p:nvSpPr>
+        <p:spPr/>
+        <p:txBody>
+          <a:bodyPr/>
+          <a:lstStyle/>
+          <a:p>
+            <a:r>
+              <a:rPr lang="da-DK" dirty="0" smtClean="0">
+                <a:latin typeface="Courier New" pitchFamily="49" charset="0"/>
+                <a:cs typeface="Courier New" pitchFamily="49" charset="0"/>
+              </a:rPr>
+              <a:t>Kommandoer</a:t>
+            </a:r>
+            <a:endParaRPr lang="da-DK" dirty="0">
+              <a:latin typeface="Courier New" pitchFamily="49" charset="0"/>
+              <a:cs typeface="Courier New" pitchFamily="49" charset="0"/>
+            </a:endParaRPr>
+          </a:p>
+        </p:txBody>
+      </p:sp>
+      <p:sp>
+        <p:nvSpPr>
+          <p:cNvPr id="3" name="Pladsholder til indhold 2"/>
+          <p:cNvSpPr>
+            <a:spLocks noGrp="1"/>
+          </p:cNvSpPr>
+          <p:nvPr>
+            <p:ph idx="1"/>
+          </p:nvPr>
+        </p:nvSpPr>
+        <p:spPr/>
+        <p:txBody>
+          <a:bodyPr>
+            <a:normAutofit/>
+          </a:bodyPr>
+          <a:lstStyle/>
+          <a:p>
+            <a:r>
+              <a:rPr lang="da-DK" dirty="0" smtClean="0">
+                <a:latin typeface="Courier New" pitchFamily="49" charset="0"/>
+                <a:cs typeface="Courier New" pitchFamily="49" charset="0"/>
+              </a:rPr>
+              <a:t>Load</a:t>
+            </a:r>
+          </a:p>
+          <a:p>
+            <a:pPr lvl="1"/>
+            <a:endParaRPr lang="da-DK" dirty="0" smtClean="0"/>
+          </a:p>
+        </p:txBody>
+      </p:sp>
+      <p:pic>
+        <p:nvPicPr>
+          <p:cNvPr id="10242" name="Picture 2" descr="C:\Users\THL\Dropbox\Ting\load.png"/>
+          <p:cNvPicPr>
+            <a:picLocks noChangeAspect="1" noChangeArrowheads="1"/>
+          </p:cNvPicPr>
+          <p:nvPr/>
+        </p:nvPicPr>
+        <p:blipFill>
+          <a:blip r:embed="rId2">
+            <a:extLst>
+              <a:ext uri="{28A0092B-C50C-407E-A947-70E740481C1C}">
+                <a14:useLocalDpi xmlns:a14="http://schemas.microsoft.com/office/drawing/2010/main" val="0"/>
+              </a:ext>
+            </a:extLst>
+          </a:blip>
+          <a:srcRect/>
+          <a:stretch>
+            <a:fillRect/>
+          </a:stretch>
+        </p:blipFill>
+        <p:spPr bwMode="auto">
+          <a:xfrm>
+            <a:off x="1475656" y="2492895"/>
+            <a:ext cx="6450013" cy="3267075"/>
+          </a:xfrm>
+          <a:prstGeom prst="rect">
+            <a:avLst/>
+          </a:prstGeom>
+          <a:noFill/>
+          <a:extLst>
+            <a:ext uri="{909E8E84-426E-40DD-AFC4-6F175D3DCCD1}">
+              <a14:hiddenFill xmlns:a14="http://schemas.microsoft.com/office/drawing/2010/main">
+                <a:solidFill>
+                  <a:srgbClr val="FFFFFF"/>
+                </a:solidFill>
+              </a14:hiddenFill>
+            </a:ext>
+          </a:extLst>
+        </p:spPr>
+      </p:pic>
+    </p:spTree>
+    <p:extLst>
+      <p:ext uri="{BB962C8B-B14F-4D97-AF65-F5344CB8AC3E}">
+        <p14:creationId xmlns:p14="http://schemas.microsoft.com/office/powerpoint/2010/main" val="279953885"/>
+      </p:ext>
+    </p:extLst>
+  </p:cSld>
+  <p:clrMapOvr>
+    <a:masterClrMapping/>
+  </p:clrMapOvr>
+</p:sld>
+</file>
+
+<file path=ppt/slides/slide13.xml><?xml version="1.0" encoding="utf-8"?>
+<p:sld xmlns:a="http://schemas.openxmlformats.org/drawingml/2006/main" xmlns:r="http://schemas.openxmlformats.org/officeDocument/2006/relationships" xmlns:p="http://schemas.openxmlformats.org/presentationml/2006/main">
+  <p:cSld>
+    <p:spTree>
+      <p:nvGrpSpPr>
+        <p:cNvPr id="1" name=""/>
+        <p:cNvGrpSpPr/>
+        <p:nvPr/>
+      </p:nvGrpSpPr>
+      <p:grpSpPr>
+        <a:xfrm>
+          <a:off x="0" y="0"/>
+          <a:ext cx="0" cy="0"/>
+          <a:chOff x="0" y="0"/>
+          <a:chExt cx="0" cy="0"/>
+        </a:xfrm>
+      </p:grpSpPr>
+      <p:sp>
+        <p:nvSpPr>
+          <p:cNvPr id="2" name="Titel 1"/>
+          <p:cNvSpPr>
+            <a:spLocks noGrp="1"/>
+          </p:cNvSpPr>
+          <p:nvPr>
+            <p:ph type="title"/>
+          </p:nvPr>
+        </p:nvSpPr>
+        <p:spPr/>
+        <p:txBody>
+          <a:bodyPr/>
+          <a:lstStyle/>
+          <a:p>
+            <a:r>
+              <a:rPr lang="da-DK" dirty="0" smtClean="0">
+                <a:latin typeface="Courier New" pitchFamily="49" charset="0"/>
+                <a:cs typeface="Courier New" pitchFamily="49" charset="0"/>
+              </a:rPr>
+              <a:t>Features i spillet</a:t>
+            </a:r>
+            <a:endParaRPr lang="da-DK" dirty="0">
+              <a:latin typeface="Courier New" pitchFamily="49" charset="0"/>
+              <a:cs typeface="Courier New" pitchFamily="49" charset="0"/>
+            </a:endParaRPr>
+          </a:p>
+        </p:txBody>
+      </p:sp>
+      <p:sp>
+        <p:nvSpPr>
+          <p:cNvPr id="3" name="Pladsholder til indhold 2"/>
+          <p:cNvSpPr>
+            <a:spLocks noGrp="1"/>
+          </p:cNvSpPr>
+          <p:nvPr>
+            <p:ph idx="1"/>
+          </p:nvPr>
+        </p:nvSpPr>
+        <p:spPr/>
+        <p:txBody>
+          <a:bodyPr/>
+          <a:lstStyle/>
+          <a:p>
+            <a:endParaRPr lang="da-DK" sz="2000" dirty="0" smtClean="0">
+              <a:latin typeface="Courier New" pitchFamily="49" charset="0"/>
+              <a:cs typeface="Courier New" pitchFamily="49" charset="0"/>
+            </a:endParaRPr>
+          </a:p>
+          <a:p>
+            <a:r>
+              <a:rPr lang="da-DK" sz="2000" dirty="0" smtClean="0">
+                <a:latin typeface="Courier New" pitchFamily="49" charset="0"/>
+                <a:cs typeface="Courier New" pitchFamily="49" charset="0"/>
+              </a:rPr>
+              <a:t>Kan </a:t>
+            </a:r>
+            <a:r>
+              <a:rPr lang="da-DK" sz="2000" dirty="0" smtClean="0">
+                <a:latin typeface="Courier New" pitchFamily="49" charset="0"/>
+                <a:cs typeface="Courier New" pitchFamily="49" charset="0"/>
+              </a:rPr>
+              <a:t>spilles over telnet eller </a:t>
+            </a:r>
+            <a:r>
+              <a:rPr lang="da-DK" sz="2000" dirty="0" smtClean="0">
+                <a:latin typeface="Courier New" pitchFamily="49" charset="0"/>
+                <a:cs typeface="Courier New" pitchFamily="49" charset="0"/>
+              </a:rPr>
+              <a:t>lokalt.</a:t>
+            </a:r>
+            <a:endParaRPr lang="da-DK" sz="2000" dirty="0" smtClean="0">
+              <a:latin typeface="Courier New" pitchFamily="49" charset="0"/>
+              <a:cs typeface="Courier New" pitchFamily="49" charset="0"/>
+            </a:endParaRPr>
+          </a:p>
+          <a:p>
+            <a:r>
+              <a:rPr lang="da-DK" sz="2000" dirty="0" smtClean="0">
+                <a:latin typeface="Courier New" pitchFamily="49" charset="0"/>
+                <a:cs typeface="Courier New" pitchFamily="49" charset="0"/>
+              </a:rPr>
+              <a:t>Muligheden </a:t>
+            </a:r>
+            <a:r>
+              <a:rPr lang="da-DK" sz="2000" dirty="0">
+                <a:latin typeface="Courier New" pitchFamily="49" charset="0"/>
+                <a:cs typeface="Courier New" pitchFamily="49" charset="0"/>
+              </a:rPr>
+              <a:t>for at </a:t>
+            </a:r>
+            <a:r>
+              <a:rPr lang="da-DK" sz="2000" dirty="0" err="1">
+                <a:latin typeface="Courier New" pitchFamily="49" charset="0"/>
+                <a:cs typeface="Courier New" pitchFamily="49" charset="0"/>
+              </a:rPr>
+              <a:t>equippe</a:t>
+            </a:r>
+            <a:r>
+              <a:rPr lang="da-DK" sz="2000" dirty="0">
+                <a:latin typeface="Courier New" pitchFamily="49" charset="0"/>
+                <a:cs typeface="Courier New" pitchFamily="49" charset="0"/>
+              </a:rPr>
+              <a:t> items i begge </a:t>
+            </a:r>
+            <a:r>
+              <a:rPr lang="da-DK" sz="2000" dirty="0" smtClean="0">
+                <a:latin typeface="Courier New" pitchFamily="49" charset="0"/>
+                <a:cs typeface="Courier New" pitchFamily="49" charset="0"/>
+              </a:rPr>
+              <a:t>hænder (slot1 og slot2).</a:t>
+            </a:r>
+            <a:endParaRPr lang="da-DK" sz="2000" dirty="0">
+              <a:latin typeface="Courier New" pitchFamily="49" charset="0"/>
+              <a:cs typeface="Courier New" pitchFamily="49" charset="0"/>
+            </a:endParaRPr>
+          </a:p>
+          <a:p>
+            <a:r>
+              <a:rPr lang="da-DK" sz="2000" dirty="0" err="1">
+                <a:latin typeface="Courier New" pitchFamily="49" charset="0"/>
+                <a:cs typeface="Courier New" pitchFamily="49" charset="0"/>
+              </a:rPr>
+              <a:t>Consumeable</a:t>
+            </a:r>
+            <a:r>
+              <a:rPr lang="da-DK" sz="2000" dirty="0">
+                <a:latin typeface="Courier New" pitchFamily="49" charset="0"/>
+                <a:cs typeface="Courier New" pitchFamily="49" charset="0"/>
+              </a:rPr>
+              <a:t> items </a:t>
+            </a:r>
+            <a:r>
+              <a:rPr lang="da-DK" sz="2000" dirty="0" smtClean="0">
+                <a:latin typeface="Courier New" pitchFamily="49" charset="0"/>
+                <a:cs typeface="Courier New" pitchFamily="49" charset="0"/>
+              </a:rPr>
+              <a:t>i </a:t>
+            </a:r>
+            <a:r>
+              <a:rPr lang="da-DK" sz="2000" dirty="0" err="1">
+                <a:latin typeface="Courier New" pitchFamily="49" charset="0"/>
+                <a:cs typeface="Courier New" pitchFamily="49" charset="0"/>
+              </a:rPr>
+              <a:t>inventory</a:t>
+            </a:r>
+            <a:r>
+              <a:rPr lang="da-DK" sz="2000" dirty="0">
+                <a:latin typeface="Courier New" pitchFamily="49" charset="0"/>
+                <a:cs typeface="Courier New" pitchFamily="49" charset="0"/>
+              </a:rPr>
+              <a:t>.</a:t>
+            </a:r>
+          </a:p>
+          <a:p>
+            <a:r>
+              <a:rPr lang="da-DK" sz="2000" dirty="0" smtClean="0">
+                <a:latin typeface="Courier New" pitchFamily="49" charset="0"/>
+                <a:cs typeface="Courier New" pitchFamily="49" charset="0"/>
+              </a:rPr>
+              <a:t>Nemt </a:t>
+            </a:r>
+            <a:r>
+              <a:rPr lang="da-DK" sz="2000" dirty="0">
+                <a:latin typeface="Courier New" pitchFamily="49" charset="0"/>
+                <a:cs typeface="Courier New" pitchFamily="49" charset="0"/>
+              </a:rPr>
+              <a:t>at tilføje nye </a:t>
+            </a:r>
+            <a:r>
+              <a:rPr lang="da-DK" sz="2000" dirty="0" err="1" smtClean="0">
+                <a:latin typeface="Courier New" pitchFamily="49" charset="0"/>
+                <a:cs typeface="Courier New" pitchFamily="49" charset="0"/>
+              </a:rPr>
+              <a:t>dungeons</a:t>
+            </a:r>
+            <a:r>
+              <a:rPr lang="da-DK" sz="2000" dirty="0" smtClean="0">
+                <a:latin typeface="Courier New" pitchFamily="49" charset="0"/>
+                <a:cs typeface="Courier New" pitchFamily="49" charset="0"/>
+              </a:rPr>
+              <a:t>, items og monstre </a:t>
+            </a:r>
+            <a:r>
+              <a:rPr lang="da-DK" sz="2000" dirty="0">
+                <a:latin typeface="Courier New" pitchFamily="49" charset="0"/>
+                <a:cs typeface="Courier New" pitchFamily="49" charset="0"/>
+              </a:rPr>
+              <a:t>ved hjælp af tekstfiler</a:t>
+            </a:r>
+            <a:r>
+              <a:rPr lang="da-DK" sz="2000" dirty="0" smtClean="0">
+                <a:latin typeface="Courier New" pitchFamily="49" charset="0"/>
+                <a:cs typeface="Courier New" pitchFamily="49" charset="0"/>
+              </a:rPr>
+              <a:t>.</a:t>
+            </a:r>
+          </a:p>
+          <a:p>
+            <a:r>
+              <a:rPr lang="da-DK" sz="2000" dirty="0" smtClean="0">
+                <a:latin typeface="Courier New" pitchFamily="49" charset="0"/>
+                <a:cs typeface="Courier New" pitchFamily="49" charset="0"/>
+              </a:rPr>
+              <a:t>Load og save funktioner.</a:t>
+            </a:r>
+          </a:p>
+          <a:p>
+            <a:r>
+              <a:rPr lang="da-DK" sz="2000" dirty="0">
+                <a:latin typeface="Courier New" pitchFamily="49" charset="0"/>
+                <a:cs typeface="Courier New" pitchFamily="49" charset="0"/>
+              </a:rPr>
+              <a:t>Meget visuelle beskrivelser</a:t>
+            </a:r>
+            <a:r>
+              <a:rPr lang="da-DK" sz="2000" dirty="0" smtClean="0">
+                <a:latin typeface="Courier New" pitchFamily="49" charset="0"/>
+                <a:cs typeface="Courier New" pitchFamily="49" charset="0"/>
+              </a:rPr>
+              <a:t>!!</a:t>
+            </a:r>
+          </a:p>
+          <a:p>
+            <a:endParaRPr lang="da-DK" sz="2000" dirty="0"/>
+          </a:p>
+          <a:p>
+            <a:endParaRPr lang="da-DK" dirty="0"/>
+          </a:p>
+        </p:txBody>
+      </p:sp>
+    </p:spTree>
+    <p:extLst>
+      <p:ext uri="{BB962C8B-B14F-4D97-AF65-F5344CB8AC3E}">
+        <p14:creationId xmlns:p14="http://schemas.microsoft.com/office/powerpoint/2010/main" val="1750451339"/>
+      </p:ext>
+    </p:extLst>
+  </p:cSld>
+  <p:clrMapOvr>
+    <a:masterClrMapping/>
+  </p:clrMapOvr>
+</p:sld>
+</file>
+
+<file path=ppt/slides/slide14.xml><?xml version="1.0" encoding="utf-8"?>
+<p:sld xmlns:a="http://schemas.openxmlformats.org/drawingml/2006/main" xmlns:r="http://schemas.openxmlformats.org/officeDocument/2006/relationships" xmlns:p="http://schemas.openxmlformats.org/presentationml/2006/main">
+  <p:cSld>
+    <p:spTree>
+      <p:nvGrpSpPr>
+        <p:cNvPr id="1" name=""/>
+        <p:cNvGrpSpPr/>
+        <p:nvPr/>
+      </p:nvGrpSpPr>
+      <p:grpSpPr>
+        <a:xfrm>
+          <a:off x="0" y="0"/>
+          <a:ext cx="0" cy="0"/>
+          <a:chOff x="0" y="0"/>
+          <a:chExt cx="0" cy="0"/>
+        </a:xfrm>
+      </p:grpSpPr>
+      <p:sp>
+        <p:nvSpPr>
+          <p:cNvPr id="2" name="Titel 1"/>
+          <p:cNvSpPr>
+            <a:spLocks noGrp="1"/>
+          </p:cNvSpPr>
+          <p:nvPr>
+            <p:ph type="title"/>
+          </p:nvPr>
+        </p:nvSpPr>
+        <p:spPr/>
+        <p:txBody>
+          <a:bodyPr>
+            <a:normAutofit fontScale="90000"/>
+          </a:bodyPr>
+          <a:lstStyle/>
+          <a:p>
+            <a:r>
+              <a:rPr lang="da-DK" dirty="0" smtClean="0">
+                <a:latin typeface="Courier New" pitchFamily="49" charset="0"/>
+                <a:cs typeface="Courier New" pitchFamily="49" charset="0"/>
+              </a:rPr>
+              <a:t>Designmønstre og strukturering</a:t>
+            </a:r>
+            <a:endParaRPr lang="da-DK" dirty="0">
+              <a:latin typeface="Courier New" pitchFamily="49" charset="0"/>
+              <a:cs typeface="Courier New" pitchFamily="49" charset="0"/>
+            </a:endParaRPr>
+          </a:p>
+        </p:txBody>
+      </p:sp>
+      <p:sp>
+        <p:nvSpPr>
+          <p:cNvPr id="3" name="Pladsholder til indhold 2"/>
+          <p:cNvSpPr>
+            <a:spLocks noGrp="1"/>
+          </p:cNvSpPr>
+          <p:nvPr>
+            <p:ph idx="1"/>
+          </p:nvPr>
+        </p:nvSpPr>
+        <p:spPr>
+          <a:xfrm>
+            <a:off x="457200" y="1916832"/>
+            <a:ext cx="8229600" cy="4209331"/>
+          </a:xfrm>
+        </p:spPr>
+        <p:txBody>
+          <a:bodyPr>
+            <a:normAutofit/>
+          </a:bodyPr>
+          <a:lstStyle/>
+          <a:p>
+            <a:r>
+              <a:rPr lang="da-DK" sz="2400" dirty="0" smtClean="0">
+                <a:latin typeface="Courier New" pitchFamily="49" charset="0"/>
+                <a:cs typeface="Courier New" pitchFamily="49" charset="0"/>
+              </a:rPr>
+              <a:t>Mulighed for at tilføje et GUI da alt bliver udskrevet fra game klassen</a:t>
+            </a:r>
+            <a:r>
+              <a:rPr lang="da-DK" sz="2400" dirty="0" smtClean="0">
+                <a:latin typeface="Courier New" pitchFamily="49" charset="0"/>
+                <a:cs typeface="Courier New" pitchFamily="49" charset="0"/>
+              </a:rPr>
+              <a:t>.</a:t>
+            </a:r>
+          </a:p>
+          <a:p>
+            <a:endParaRPr lang="da-DK" sz="2400" dirty="0" smtClean="0">
+              <a:latin typeface="Courier New" pitchFamily="49" charset="0"/>
+              <a:cs typeface="Courier New" pitchFamily="49" charset="0"/>
+            </a:endParaRPr>
+          </a:p>
+          <a:p>
+            <a:r>
+              <a:rPr lang="da-DK" sz="2400" dirty="0" smtClean="0">
+                <a:latin typeface="Courier New" pitchFamily="49" charset="0"/>
+                <a:cs typeface="Courier New" pitchFamily="49" charset="0"/>
+              </a:rPr>
+              <a:t>Model </a:t>
+            </a:r>
+            <a:r>
+              <a:rPr lang="da-DK" sz="2400" dirty="0" err="1" smtClean="0">
+                <a:latin typeface="Courier New" pitchFamily="49" charset="0"/>
+                <a:cs typeface="Courier New" pitchFamily="49" charset="0"/>
+              </a:rPr>
+              <a:t>View</a:t>
+            </a:r>
+            <a:r>
+              <a:rPr lang="da-DK" sz="2400" dirty="0" smtClean="0">
+                <a:latin typeface="Courier New" pitchFamily="49" charset="0"/>
+                <a:cs typeface="Courier New" pitchFamily="49" charset="0"/>
+              </a:rPr>
+              <a:t> Control design.</a:t>
+            </a:r>
+          </a:p>
+          <a:p>
+            <a:pPr marL="0" indent="0">
+              <a:buNone/>
+            </a:pPr>
+            <a:endParaRPr lang="da-DK" sz="2400" dirty="0">
+              <a:latin typeface="Courier New" pitchFamily="49" charset="0"/>
+              <a:cs typeface="Courier New" pitchFamily="49" charset="0"/>
+            </a:endParaRPr>
+          </a:p>
+          <a:p>
+            <a:pPr marL="0" indent="0">
+              <a:buNone/>
+            </a:pPr>
+            <a:endParaRPr lang="da-DK" sz="2400" dirty="0">
+              <a:latin typeface="Courier New" pitchFamily="49" charset="0"/>
+              <a:cs typeface="Courier New" pitchFamily="49" charset="0"/>
+            </a:endParaRPr>
+          </a:p>
+        </p:txBody>
+      </p:sp>
+    </p:spTree>
+    <p:extLst>
+      <p:ext uri="{BB962C8B-B14F-4D97-AF65-F5344CB8AC3E}">
+        <p14:creationId xmlns:p14="http://schemas.microsoft.com/office/powerpoint/2010/main" val="3671612686"/>
+      </p:ext>
+    </p:extLst>
+  </p:cSld>
+  <p:clrMapOvr>
+    <a:masterClrMapping/>
+  </p:clrMapOvr>
+</p:sld>
+</file>
+
+<file path=ppt/slides/slide15.xml><?xml version="1.0" encoding="utf-8"?>
+<p:sld xmlns:a="http://schemas.openxmlformats.org/drawingml/2006/main" xmlns:r="http://schemas.openxmlformats.org/officeDocument/2006/relationships" xmlns:p="http://schemas.openxmlformats.org/presentationml/2006/main">
+  <p:cSld>
+    <p:spTree>
+      <p:nvGrpSpPr>
+        <p:cNvPr id="1" name=""/>
+        <p:cNvGrpSpPr/>
+        <p:nvPr/>
+      </p:nvGrpSpPr>
+      <p:grpSpPr>
+        <a:xfrm>
+          <a:off x="0" y="0"/>
+          <a:ext cx="0" cy="0"/>
+          <a:chOff x="0" y="0"/>
+          <a:chExt cx="0" cy="0"/>
+        </a:xfrm>
+      </p:grpSpPr>
+      <p:sp>
+        <p:nvSpPr>
+          <p:cNvPr id="2" name="Titel 1"/>
+          <p:cNvSpPr>
+            <a:spLocks noGrp="1"/>
+          </p:cNvSpPr>
+          <p:nvPr>
+            <p:ph type="title"/>
+          </p:nvPr>
+        </p:nvSpPr>
+        <p:spPr/>
+        <p:txBody>
+          <a:bodyPr/>
+          <a:lstStyle/>
+          <a:p>
+            <a:r>
+              <a:rPr lang="da-DK" dirty="0" smtClean="0">
+                <a:latin typeface="Courier New" pitchFamily="49" charset="0"/>
+                <a:cs typeface="Courier New" pitchFamily="49" charset="0"/>
+              </a:rPr>
+              <a:t>Vores Tanker</a:t>
+            </a:r>
+            <a:endParaRPr lang="da-DK" dirty="0">
+              <a:latin typeface="Courier New" pitchFamily="49" charset="0"/>
+              <a:cs typeface="Courier New" pitchFamily="49" charset="0"/>
+            </a:endParaRPr>
+          </a:p>
+        </p:txBody>
+      </p:sp>
+      <p:sp>
+        <p:nvSpPr>
+          <p:cNvPr id="3" name="Pladsholder til indhold 2"/>
+          <p:cNvSpPr>
+            <a:spLocks noGrp="1"/>
+          </p:cNvSpPr>
+          <p:nvPr>
+            <p:ph idx="1"/>
+          </p:nvPr>
+        </p:nvSpPr>
+        <p:spPr/>
+        <p:txBody>
+          <a:bodyPr/>
+          <a:lstStyle/>
+          <a:p>
+            <a:r>
+              <a:rPr lang="da-DK" dirty="0" smtClean="0">
+                <a:latin typeface="Courier New" pitchFamily="49" charset="0"/>
+                <a:cs typeface="Courier New" pitchFamily="49" charset="0"/>
+              </a:rPr>
+              <a:t>Opbygning af foldere/</a:t>
+            </a:r>
+            <a:r>
+              <a:rPr lang="da-DK" dirty="0" err="1" smtClean="0">
+                <a:latin typeface="Courier New" pitchFamily="49" charset="0"/>
+                <a:cs typeface="Courier New" pitchFamily="49" charset="0"/>
+              </a:rPr>
+              <a:t>dungeons</a:t>
+            </a:r>
+            <a:r>
+              <a:rPr lang="da-DK" dirty="0" smtClean="0">
+                <a:latin typeface="Courier New" pitchFamily="49" charset="0"/>
+                <a:cs typeface="Courier New" pitchFamily="49" charset="0"/>
+              </a:rPr>
+              <a:t>:</a:t>
+            </a:r>
+          </a:p>
+          <a:p>
+            <a:pPr lvl="1"/>
+            <a:r>
+              <a:rPr lang="da-DK" dirty="0" smtClean="0">
+                <a:latin typeface="Courier New" pitchFamily="49" charset="0"/>
+                <a:cs typeface="Courier New" pitchFamily="49" charset="0"/>
+              </a:rPr>
+              <a:t>Monstre, items og </a:t>
+            </a:r>
+            <a:r>
+              <a:rPr lang="da-DK" dirty="0" err="1" smtClean="0">
+                <a:latin typeface="Courier New" pitchFamily="49" charset="0"/>
+                <a:cs typeface="Courier New" pitchFamily="49" charset="0"/>
+              </a:rPr>
+              <a:t>dungeon</a:t>
+            </a:r>
+            <a:r>
+              <a:rPr lang="da-DK" dirty="0" smtClean="0">
+                <a:latin typeface="Courier New" pitchFamily="49" charset="0"/>
+                <a:cs typeface="Courier New" pitchFamily="49" charset="0"/>
+              </a:rPr>
+              <a:t> i en folder med </a:t>
+            </a:r>
+            <a:r>
+              <a:rPr lang="da-DK" dirty="0" err="1" smtClean="0">
+                <a:latin typeface="Courier New" pitchFamily="49" charset="0"/>
+                <a:cs typeface="Courier New" pitchFamily="49" charset="0"/>
+              </a:rPr>
+              <a:t>dungeon</a:t>
+            </a:r>
+            <a:r>
+              <a:rPr lang="da-DK" dirty="0" smtClean="0">
+                <a:latin typeface="Courier New" pitchFamily="49" charset="0"/>
+                <a:cs typeface="Courier New" pitchFamily="49" charset="0"/>
+              </a:rPr>
+              <a:t> navn.</a:t>
+            </a:r>
+          </a:p>
+          <a:p>
+            <a:pPr marL="514350" indent="-457200"/>
+            <a:r>
+              <a:rPr lang="da-DK" dirty="0" smtClean="0">
+                <a:latin typeface="Courier New" pitchFamily="49" charset="0"/>
+                <a:cs typeface="Courier New" pitchFamily="49" charset="0"/>
+              </a:rPr>
+              <a:t>Hit/miss chance.</a:t>
+            </a:r>
+          </a:p>
+          <a:p>
+            <a:pPr marL="457200" lvl="1" indent="0">
+              <a:buNone/>
+            </a:pPr>
+            <a:endParaRPr lang="da-DK" dirty="0" smtClean="0">
+              <a:latin typeface="Courier New" pitchFamily="49" charset="0"/>
+              <a:cs typeface="Courier New" pitchFamily="49" charset="0"/>
+            </a:endParaRPr>
+          </a:p>
+        </p:txBody>
+      </p:sp>
+    </p:spTree>
+    <p:extLst>
+      <p:ext uri="{BB962C8B-B14F-4D97-AF65-F5344CB8AC3E}">
+        <p14:creationId xmlns:p14="http://schemas.microsoft.com/office/powerpoint/2010/main" val="708790672"/>
+      </p:ext>
+    </p:extLst>
+  </p:cSld>
+  <p:clrMapOvr>
+    <a:masterClrMapping/>
+  </p:clrMapOvr>
+</p:sld>
+</file>
+
 <file path=ppt/slides/slide2.xml><?xml version="1.0" encoding="utf-8"?>
 <p:sld xmlns:a="http://schemas.openxmlformats.org/drawingml/2006/main" xmlns:r="http://schemas.openxmlformats.org/officeDocument/2006/relationships" xmlns:p="http://schemas.openxmlformats.org/presentationml/2006/main">
   <p:cSld>
@@ -3130,30 +4084,12 @@
             <p:ph type="title"/>
           </p:nvPr>
         </p:nvSpPr>
-        <p:spPr/>
-        <p:txBody>
-          <a:bodyPr/>
-          <a:lstStyle/>
-          <a:p>
-            <a:r>
-              <a:rPr lang="da-DK" dirty="0" smtClean="0"/>
-              <a:t>Teknikker og metoder</a:t>
-            </a:r>
-            <a:endParaRPr lang="da-DK" dirty="0"/>
-          </a:p>
-        </p:txBody>
-      </p:sp>
-      <p:sp>
-        <p:nvSpPr>
-          <p:cNvPr id="3" name="Pladsholder til indhold 2"/>
-          <p:cNvSpPr>
-            <a:spLocks noGrp="1"/>
-          </p:cNvSpPr>
-          <p:nvPr>
-            <p:ph idx="1"/>
-          </p:nvPr>
-        </p:nvSpPr>
-        <p:spPr/>
+        <p:spPr>
+          <a:xfrm>
+            <a:off x="467544" y="188640"/>
+            <a:ext cx="8229600" cy="706090"/>
+          </a:xfrm>
+        </p:spPr>
         <p:txBody>
           <a:bodyPr>
             <a:normAutofit/>
@@ -3161,32 +4097,277 @@
           <a:lstStyle/>
           <a:p>
             <a:r>
-              <a:rPr lang="da-DK" sz="2000" dirty="0" smtClean="0"/>
-              <a:t>Telnet server</a:t>
-            </a:r>
-          </a:p>
-          <a:p>
-            <a:r>
-              <a:rPr lang="da-DK" sz="2000" dirty="0" err="1" smtClean="0"/>
+              <a:rPr lang="da-DK" sz="3600" dirty="0" smtClean="0">
+                <a:latin typeface="Consolas" pitchFamily="49" charset="0"/>
+                <a:cs typeface="Consolas" pitchFamily="49" charset="0"/>
+              </a:rPr>
+              <a:t>Teknikker og metoder</a:t>
+            </a:r>
+            <a:endParaRPr lang="da-DK" sz="3600" dirty="0">
+              <a:latin typeface="Consolas" pitchFamily="49" charset="0"/>
+              <a:cs typeface="Consolas" pitchFamily="49" charset="0"/>
+            </a:endParaRPr>
+          </a:p>
+        </p:txBody>
+      </p:sp>
+      <p:sp>
+        <p:nvSpPr>
+          <p:cNvPr id="3" name="Pladsholder til indhold 2"/>
+          <p:cNvSpPr>
+            <a:spLocks noGrp="1"/>
+          </p:cNvSpPr>
+          <p:nvPr>
+            <p:ph idx="1"/>
+          </p:nvPr>
+        </p:nvSpPr>
+        <p:spPr>
+          <a:xfrm>
+            <a:off x="467544" y="1052736"/>
+            <a:ext cx="8229600" cy="5400600"/>
+          </a:xfrm>
+        </p:spPr>
+        <p:txBody>
+          <a:bodyPr>
+            <a:normAutofit/>
+          </a:bodyPr>
+          <a:lstStyle/>
+          <a:p>
+            <a:r>
+              <a:rPr lang="da-DK" sz="2000" b="1" dirty="0" smtClean="0">
+                <a:latin typeface="Courier New" pitchFamily="49" charset="0"/>
+                <a:cs typeface="Courier New" pitchFamily="49" charset="0"/>
+              </a:rPr>
+              <a:t>Telnet </a:t>
+            </a:r>
+            <a:r>
+              <a:rPr lang="da-DK" sz="2000" b="1" dirty="0" smtClean="0">
+                <a:latin typeface="Courier New" pitchFamily="49" charset="0"/>
+                <a:cs typeface="Courier New" pitchFamily="49" charset="0"/>
+              </a:rPr>
+              <a:t>server</a:t>
+            </a:r>
+          </a:p>
+          <a:p>
+            <a:pPr marL="0" indent="0">
+              <a:buNone/>
+            </a:pPr>
+            <a:r>
+              <a:rPr lang="da-DK" sz="2000" dirty="0">
+                <a:latin typeface="Courier New" pitchFamily="49" charset="0"/>
+                <a:cs typeface="Courier New" pitchFamily="49" charset="0"/>
+              </a:rPr>
+              <a:t>	</a:t>
+            </a:r>
+            <a:r>
+              <a:rPr lang="da-DK" sz="1600" dirty="0" smtClean="0">
+                <a:latin typeface="Courier New" pitchFamily="49" charset="0"/>
+                <a:cs typeface="Courier New" pitchFamily="49" charset="0"/>
+              </a:rPr>
+              <a:t>Så man kan forbinde til en server og spille vores </a:t>
+            </a:r>
+            <a:r>
+              <a:rPr lang="da-DK" sz="1600" dirty="0" err="1" smtClean="0">
+                <a:latin typeface="Courier New" pitchFamily="49" charset="0"/>
+                <a:cs typeface="Courier New" pitchFamily="49" charset="0"/>
+              </a:rPr>
+              <a:t>mud</a:t>
+            </a:r>
+            <a:r>
+              <a:rPr lang="da-DK" sz="1600" dirty="0" smtClean="0">
+                <a:latin typeface="Courier New" pitchFamily="49" charset="0"/>
+                <a:cs typeface="Courier New" pitchFamily="49" charset="0"/>
+              </a:rPr>
+              <a:t>.</a:t>
+            </a:r>
+          </a:p>
+          <a:p>
+            <a:r>
+              <a:rPr lang="da-DK" sz="2000" b="1" dirty="0" err="1" smtClean="0">
+                <a:latin typeface="Courier New" pitchFamily="49" charset="0"/>
+                <a:cs typeface="Courier New" pitchFamily="49" charset="0"/>
+              </a:rPr>
+              <a:t>Threading</a:t>
+            </a:r>
+            <a:endParaRPr lang="da-DK" sz="2000" b="1" dirty="0">
+              <a:latin typeface="Courier New" pitchFamily="49" charset="0"/>
+              <a:cs typeface="Courier New" pitchFamily="49" charset="0"/>
+            </a:endParaRPr>
+          </a:p>
+          <a:p>
+            <a:pPr marL="0" indent="0">
+              <a:buNone/>
+            </a:pPr>
+            <a:r>
+              <a:rPr lang="da-DK" sz="2000" dirty="0" smtClean="0">
+                <a:latin typeface="Courier New" pitchFamily="49" charset="0"/>
+                <a:cs typeface="Courier New" pitchFamily="49" charset="0"/>
+              </a:rPr>
+              <a:t>	</a:t>
+            </a:r>
+            <a:r>
+              <a:rPr lang="da-DK" sz="1600" dirty="0" smtClean="0">
+                <a:latin typeface="Courier New" pitchFamily="49" charset="0"/>
+                <a:cs typeface="Courier New" pitchFamily="49" charset="0"/>
+              </a:rPr>
+              <a:t>Mulighed for at flere forbinder og spiller forskellige 	instanser af vores </a:t>
+            </a:r>
+            <a:r>
+              <a:rPr lang="da-DK" sz="1600" dirty="0" err="1" smtClean="0">
+                <a:latin typeface="Courier New" pitchFamily="49" charset="0"/>
+                <a:cs typeface="Courier New" pitchFamily="49" charset="0"/>
+              </a:rPr>
+              <a:t>mud</a:t>
+            </a:r>
+            <a:r>
+              <a:rPr lang="da-DK" sz="1600" dirty="0" smtClean="0">
+                <a:latin typeface="Courier New" pitchFamily="49" charset="0"/>
+                <a:cs typeface="Courier New" pitchFamily="49" charset="0"/>
+              </a:rPr>
+              <a:t>.</a:t>
+            </a:r>
+            <a:endParaRPr lang="da-DK" sz="1600" dirty="0" smtClean="0">
+              <a:latin typeface="Courier New" pitchFamily="49" charset="0"/>
+              <a:cs typeface="Courier New" pitchFamily="49" charset="0"/>
+            </a:endParaRPr>
+          </a:p>
+          <a:p>
+            <a:r>
+              <a:rPr lang="da-DK" sz="2000" b="1" dirty="0" err="1" smtClean="0">
+                <a:latin typeface="Courier New" pitchFamily="49" charset="0"/>
+                <a:cs typeface="Courier New" pitchFamily="49" charset="0"/>
+              </a:rPr>
               <a:t>Cloneable</a:t>
             </a:r>
-            <a:endParaRPr lang="da-DK" sz="2000" dirty="0" smtClean="0"/>
-          </a:p>
-          <a:p>
-            <a:r>
-              <a:rPr lang="da-DK" sz="2000" dirty="0" err="1" smtClean="0"/>
+            <a:endParaRPr lang="da-DK" sz="2000" b="1" dirty="0" smtClean="0">
+              <a:latin typeface="Courier New" pitchFamily="49" charset="0"/>
+              <a:cs typeface="Courier New" pitchFamily="49" charset="0"/>
+            </a:endParaRPr>
+          </a:p>
+          <a:p>
+            <a:pPr marL="0" indent="0">
+              <a:buNone/>
+            </a:pPr>
+            <a:r>
+              <a:rPr lang="da-DK" sz="2000" dirty="0">
+                <a:latin typeface="Courier New" pitchFamily="49" charset="0"/>
+                <a:cs typeface="Courier New" pitchFamily="49" charset="0"/>
+              </a:rPr>
+              <a:t>	</a:t>
+            </a:r>
+            <a:r>
+              <a:rPr lang="da-DK" sz="1600" dirty="0" smtClean="0">
+                <a:latin typeface="Courier New" pitchFamily="49" charset="0"/>
+                <a:cs typeface="Courier New" pitchFamily="49" charset="0"/>
+              </a:rPr>
+              <a:t>Skaber ”kloner” af de enkelte monstre til hvert rum.</a:t>
+            </a:r>
+            <a:endParaRPr lang="da-DK" sz="1600" dirty="0" smtClean="0">
+              <a:latin typeface="Courier New" pitchFamily="49" charset="0"/>
+              <a:cs typeface="Courier New" pitchFamily="49" charset="0"/>
+            </a:endParaRPr>
+          </a:p>
+          <a:p>
+            <a:r>
+              <a:rPr lang="da-DK" sz="2000" b="1" dirty="0" err="1" smtClean="0">
+                <a:latin typeface="Courier New" pitchFamily="49" charset="0"/>
+                <a:cs typeface="Courier New" pitchFamily="49" charset="0"/>
+              </a:rPr>
               <a:t>Serializeable</a:t>
             </a:r>
-            <a:endParaRPr lang="da-DK" sz="2000" dirty="0" smtClean="0"/>
-          </a:p>
-          <a:p>
-            <a:r>
-              <a:rPr lang="da-DK" sz="2000" dirty="0" smtClean="0"/>
+            <a:endParaRPr lang="da-DK" sz="2000" b="1" dirty="0" smtClean="0">
+              <a:latin typeface="Courier New" pitchFamily="49" charset="0"/>
+              <a:cs typeface="Courier New" pitchFamily="49" charset="0"/>
+            </a:endParaRPr>
+          </a:p>
+          <a:p>
+            <a:pPr marL="0" indent="0">
+              <a:buNone/>
+            </a:pPr>
+            <a:r>
+              <a:rPr lang="da-DK" sz="2000" dirty="0" smtClean="0">
+                <a:latin typeface="Courier New" pitchFamily="49" charset="0"/>
+                <a:cs typeface="Courier New" pitchFamily="49" charset="0"/>
+              </a:rPr>
+              <a:t>	</a:t>
+            </a:r>
+            <a:r>
+              <a:rPr lang="da-DK" sz="1600" dirty="0" smtClean="0">
+                <a:latin typeface="Courier New" pitchFamily="49" charset="0"/>
+                <a:cs typeface="Courier New" pitchFamily="49" charset="0"/>
+              </a:rPr>
+              <a:t>Bruges til at gemme alle objekters nuværende tilstand i 	vores savegame.</a:t>
+            </a:r>
+            <a:endParaRPr lang="da-DK" sz="1600" dirty="0" smtClean="0">
+              <a:latin typeface="Courier New" pitchFamily="49" charset="0"/>
+              <a:cs typeface="Courier New" pitchFamily="49" charset="0"/>
+            </a:endParaRPr>
+          </a:p>
+          <a:p>
+            <a:r>
+              <a:rPr lang="da-DK" sz="2000" b="1" dirty="0" smtClean="0">
+                <a:latin typeface="Courier New" pitchFamily="49" charset="0"/>
+                <a:cs typeface="Courier New" pitchFamily="49" charset="0"/>
+              </a:rPr>
               <a:t>Runable</a:t>
             </a:r>
           </a:p>
           <a:p>
-            <a:endParaRPr lang="da-DK" sz="2000" dirty="0" smtClean="0"/>
+            <a:pPr marL="0" indent="0">
+              <a:buNone/>
+            </a:pPr>
+            <a:r>
+              <a:rPr lang="da-DK" sz="2000" dirty="0" smtClean="0">
+                <a:latin typeface="Courier New" pitchFamily="49" charset="0"/>
+                <a:cs typeface="Courier New" pitchFamily="49" charset="0"/>
+              </a:rPr>
+              <a:t>	</a:t>
+            </a:r>
+            <a:r>
+              <a:rPr lang="da-DK" sz="1600" dirty="0" smtClean="0">
+                <a:latin typeface="Courier New" pitchFamily="49" charset="0"/>
+                <a:cs typeface="Courier New" pitchFamily="49" charset="0"/>
+              </a:rPr>
+              <a:t>Gør det muligt for de enkelte </a:t>
+            </a:r>
+            <a:r>
+              <a:rPr lang="da-DK" sz="1600" dirty="0" err="1" smtClean="0">
+                <a:latin typeface="Courier New" pitchFamily="49" charset="0"/>
+                <a:cs typeface="Courier New" pitchFamily="49" charset="0"/>
+              </a:rPr>
+              <a:t>theads</a:t>
+            </a:r>
+            <a:r>
+              <a:rPr lang="da-DK" sz="1600" dirty="0" smtClean="0">
+                <a:latin typeface="Courier New" pitchFamily="49" charset="0"/>
+                <a:cs typeface="Courier New" pitchFamily="49" charset="0"/>
+              </a:rPr>
+              <a:t> at køre game.</a:t>
+            </a:r>
+          </a:p>
+          <a:p>
+            <a:r>
+              <a:rPr lang="da-DK" sz="2000" b="1" dirty="0" smtClean="0">
+                <a:latin typeface="Courier New" pitchFamily="49" charset="0"/>
+                <a:cs typeface="Courier New" pitchFamily="49" charset="0"/>
+              </a:rPr>
+              <a:t>Switch Case</a:t>
+            </a:r>
+          </a:p>
+          <a:p>
+            <a:pPr marL="914400" lvl="2" indent="0">
+              <a:buNone/>
+            </a:pPr>
+            <a:r>
+              <a:rPr lang="da-DK" sz="1600" dirty="0" smtClean="0">
+                <a:latin typeface="Courier New" pitchFamily="49" charset="0"/>
+                <a:cs typeface="Courier New" pitchFamily="49" charset="0"/>
+              </a:rPr>
+              <a:t>Bruges til at bedømme hvilken kommando spilleren indtaster og sætter de tilhørende metoder i gang.</a:t>
+            </a:r>
+            <a:endParaRPr lang="da-DK" sz="1600" dirty="0" smtClean="0">
+              <a:latin typeface="Courier New" pitchFamily="49" charset="0"/>
+              <a:cs typeface="Courier New" pitchFamily="49" charset="0"/>
+            </a:endParaRPr>
           </a:p>
           <a:p>
             <a:endParaRPr lang="da-DK" sz="2000" dirty="0" smtClean="0"/>
@@ -3243,7 +4424,7 @@
           <a:p>
             <a:r>
               <a:rPr lang="da-DK" dirty="0" smtClean="0"/>
-              <a:t>Features i spillet</a:t>
+              <a:t>Kommandoer</a:t>
             </a:r>
             <a:endParaRPr lang="da-DK" dirty="0"/>
           </a:p>
@@ -3261,105 +4442,78 @@
         </p:nvSpPr>
         <p:spPr/>
         <p:txBody>
-          <a:bodyPr/>
-          <a:lstStyle/>
-          <a:p>
-            <a:r>
-              <a:rPr lang="da-DK" sz="2000" dirty="0" smtClean="0"/>
-              <a:t>Kan spilles over telnet eller lokalt</a:t>
-            </a:r>
-          </a:p>
-          <a:p>
-            <a:r>
-              <a:rPr lang="da-DK" sz="2000" dirty="0" smtClean="0"/>
-              <a:t>Muligheden </a:t>
-            </a:r>
-            <a:r>
-              <a:rPr lang="da-DK" sz="2000" dirty="0"/>
-              <a:t>for at </a:t>
-            </a:r>
-            <a:r>
-              <a:rPr lang="da-DK" sz="2000" dirty="0" err="1"/>
-              <a:t>equippe</a:t>
-            </a:r>
-            <a:r>
-              <a:rPr lang="da-DK" sz="2000" dirty="0"/>
-              <a:t> items i begge hænder</a:t>
-            </a:r>
-          </a:p>
-          <a:p>
-            <a:r>
-              <a:rPr lang="da-DK" sz="2000" dirty="0" err="1"/>
-              <a:t>Consumeable</a:t>
-            </a:r>
-            <a:r>
-              <a:rPr lang="da-DK" sz="2000" dirty="0"/>
-              <a:t> items in </a:t>
-            </a:r>
-            <a:r>
-              <a:rPr lang="da-DK" sz="2000" dirty="0" err="1"/>
-              <a:t>inventory</a:t>
-            </a:r>
-            <a:r>
-              <a:rPr lang="da-DK" sz="2000" dirty="0"/>
+          <a:bodyPr>
+            <a:normAutofit/>
+          </a:bodyPr>
+          <a:lstStyle/>
+          <a:p>
+            <a:r>
+              <a:rPr lang="da-DK" dirty="0" smtClean="0"/>
+              <a:t>Start</a:t>
+            </a:r>
+          </a:p>
+          <a:p>
+            <a:pPr lvl="1"/>
+            <a:r>
+              <a:rPr lang="da-DK" dirty="0" smtClean="0"/>
+              <a:t>Velkommen til vores </a:t>
+            </a:r>
+            <a:r>
+              <a:rPr lang="da-DK" dirty="0" err="1" smtClean="0"/>
+              <a:t>dungeon</a:t>
+            </a:r>
+            <a:r>
+              <a:rPr lang="da-DK" dirty="0" smtClean="0"/>
               <a:t>.</a:t>
             </a:r>
           </a:p>
-          <a:p>
-            <a:r>
-              <a:rPr lang="da-DK" sz="2000" dirty="0" smtClean="0"/>
-              <a:t>Nemt </a:t>
-            </a:r>
-            <a:r>
-              <a:rPr lang="da-DK" sz="2000" dirty="0"/>
-              <a:t>at tilføje nye </a:t>
-            </a:r>
-            <a:r>
-              <a:rPr lang="da-DK" sz="2000" dirty="0" err="1"/>
-              <a:t>dungeons</a:t>
-            </a:r>
-            <a:r>
-              <a:rPr lang="da-DK" sz="2000" dirty="0"/>
-              <a:t> ved hjælp af tekstfiler</a:t>
-            </a:r>
-            <a:r>
-              <a:rPr lang="da-DK" sz="2000" dirty="0" smtClean="0"/>
-              <a:t>.</a:t>
-            </a:r>
-          </a:p>
-          <a:p>
-            <a:r>
-              <a:rPr lang="da-DK" sz="2000" dirty="0" smtClean="0"/>
-              <a:t>Load og save funktioner</a:t>
-            </a:r>
-            <a:r>
-              <a:rPr lang="da-DK" sz="2000" dirty="0" smtClean="0"/>
-              <a:t>.</a:t>
-            </a:r>
-          </a:p>
-          <a:p>
-            <a:r>
-              <a:rPr lang="da-DK" sz="2000" dirty="0"/>
-              <a:t>Meget visuelle beskrivelser</a:t>
-            </a:r>
-            <a:r>
-              <a:rPr lang="da-DK" sz="2000" dirty="0" smtClean="0"/>
-              <a:t>!!</a:t>
-            </a:r>
-            <a:endParaRPr lang="da-DK" sz="2000" dirty="0" smtClean="0"/>
-          </a:p>
-          <a:p>
-            <a:endParaRPr lang="da-DK" sz="2000" dirty="0"/>
-          </a:p>
-          <a:p>
-            <a:endParaRPr lang="da-DK" dirty="0"/>
-          </a:p>
-        </p:txBody>
-      </p:sp>
+        </p:txBody>
+      </p:sp>
+      <p:pic>
+        <p:nvPicPr>
+          <p:cNvPr id="5122" name="Picture 2" descr="C:\Users\THL\Dropbox\Ting\start.png"/>
+          <p:cNvPicPr>
+            <a:picLocks noChangeAspect="1" noChangeArrowheads="1"/>
+          </p:cNvPicPr>
+          <p:nvPr/>
+        </p:nvPicPr>
+        <p:blipFill>
+          <a:blip r:embed="rId2">
+            <a:extLst>
+              <a:ext uri="{28A0092B-C50C-407E-A947-70E740481C1C}">
+                <a14:useLocalDpi xmlns:a14="http://schemas.microsoft.com/office/drawing/2010/main" val="0"/>
+              </a:ext>
+            </a:extLst>
+          </a:blip>
+          <a:srcRect/>
+          <a:stretch>
+            <a:fillRect/>
+          </a:stretch>
+        </p:blipFill>
+        <p:spPr bwMode="auto">
+          <a:xfrm>
+            <a:off x="1547664" y="2783907"/>
+            <a:ext cx="6450013" cy="3267075"/>
+          </a:xfrm>
+          <a:prstGeom prst="rect">
+            <a:avLst/>
+          </a:prstGeom>
+          <a:noFill/>
+          <a:extLst>
+            <a:ext uri="{909E8E84-426E-40DD-AFC4-6F175D3DCCD1}">
+              <a14:hiddenFill xmlns:a14="http://schemas.microsoft.com/office/drawing/2010/main">
+                <a:solidFill>
+                  <a:srgbClr val="FFFFFF"/>
+                </a:solidFill>
+              </a14:hiddenFill>
+            </a:ext>
+          </a:extLst>
+        </p:spPr>
+      </p:pic>
     </p:spTree>
     <p:extLst>
       <p:ext uri="{BB962C8B-B14F-4D97-AF65-F5344CB8AC3E}">
-        <p14:creationId xmlns:p14="http://schemas.microsoft.com/office/powerpoint/2010/main" val="1750451339"/>
+        <p14:creationId xmlns:p14="http://schemas.microsoft.com/office/powerpoint/2010/main" val="3966142679"/>
       </p:ext>
     </p:extLst>
   </p:cSld>
@@ -3403,7 +4557,7 @@
           <a:p>
             <a:r>
               <a:rPr lang="da-DK" dirty="0" smtClean="0"/>
-              <a:t>Designmønstre og strukturering</a:t>
+              <a:t>Kommandoer</a:t>
             </a:r>
             <a:endParaRPr lang="da-DK" dirty="0"/>
           </a:p>
@@ -3421,27 +4575,755 @@
         </p:nvSpPr>
         <p:spPr/>
         <p:txBody>
-          <a:bodyPr/>
+          <a:bodyPr>
+            <a:normAutofit/>
+          </a:bodyPr>
           <a:lstStyle/>
           <a:p>
             <a:r>
               <a:rPr lang="da-DK" dirty="0" smtClean="0"/>
-              <a:t>Mulighed for at tilføje et GUI da alt bliver udskrevet fra game klassen.</a:t>
-            </a:r>
-          </a:p>
-          <a:p>
-            <a:r>
-              <a:rPr lang="da-DK" smtClean="0"/>
-              <a:t>MVC design</a:t>
-            </a:r>
-            <a:endParaRPr lang="da-DK" dirty="0"/>
-          </a:p>
-        </p:txBody>
-      </p:sp>
+              <a:t>North/South/East/West</a:t>
+            </a:r>
+          </a:p>
+          <a:p>
+            <a:pPr marL="457200" lvl="1" indent="0">
+              <a:buNone/>
+            </a:pPr>
+            <a:endParaRPr lang="da-DK" dirty="0" smtClean="0"/>
+          </a:p>
+        </p:txBody>
+      </p:sp>
+      <p:pic>
+        <p:nvPicPr>
+          <p:cNvPr id="2050" name="Picture 2" descr="C:\Users\THL\Dropbox\Ting\move.png"/>
+          <p:cNvPicPr>
+            <a:picLocks noChangeAspect="1" noChangeArrowheads="1"/>
+          </p:cNvPicPr>
+          <p:nvPr/>
+        </p:nvPicPr>
+        <p:blipFill>
+          <a:blip r:embed="rId2">
+            <a:extLst>
+              <a:ext uri="{28A0092B-C50C-407E-A947-70E740481C1C}">
+                <a14:useLocalDpi xmlns:a14="http://schemas.microsoft.com/office/drawing/2010/main" val="0"/>
+              </a:ext>
+            </a:extLst>
+          </a:blip>
+          <a:srcRect/>
+          <a:stretch>
+            <a:fillRect/>
+          </a:stretch>
+        </p:blipFill>
+        <p:spPr bwMode="auto">
+          <a:xfrm>
+            <a:off x="1403647" y="2472056"/>
+            <a:ext cx="6450013" cy="3267075"/>
+          </a:xfrm>
+          <a:prstGeom prst="rect">
+            <a:avLst/>
+          </a:prstGeom>
+          <a:noFill/>
+          <a:extLst>
+            <a:ext uri="{909E8E84-426E-40DD-AFC4-6F175D3DCCD1}">
+              <a14:hiddenFill xmlns:a14="http://schemas.microsoft.com/office/drawing/2010/main">
+                <a:solidFill>
+                  <a:srgbClr val="FFFFFF"/>
+                </a:solidFill>
+              </a14:hiddenFill>
+            </a:ext>
+          </a:extLst>
+        </p:spPr>
+      </p:pic>
     </p:spTree>
     <p:extLst>
       <p:ext uri="{BB962C8B-B14F-4D97-AF65-F5344CB8AC3E}">
-        <p14:creationId xmlns:p14="http://schemas.microsoft.com/office/powerpoint/2010/main" val="3671612686"/>
+        <p14:creationId xmlns:p14="http://schemas.microsoft.com/office/powerpoint/2010/main" val="3980796128"/>
+      </p:ext>
+    </p:extLst>
+  </p:cSld>
+  <p:clrMapOvr>
+    <a:masterClrMapping/>
+  </p:clrMapOvr>
+</p:sld>
+</file>
+
+<file path=ppt/slides/slide5.xml><?xml version="1.0" encoding="utf-8"?>
+<p:sld xmlns:a="http://schemas.openxmlformats.org/drawingml/2006/main" xmlns:r="http://schemas.openxmlformats.org/officeDocument/2006/relationships" xmlns:p="http://schemas.openxmlformats.org/presentationml/2006/main">
+  <p:cSld>
+    <p:spTree>
+      <p:nvGrpSpPr>
+        <p:cNvPr id="1" name=""/>
+        <p:cNvGrpSpPr/>
+        <p:nvPr/>
+      </p:nvGrpSpPr>
+      <p:grpSpPr>
+        <a:xfrm>
+          <a:off x="0" y="0"/>
+          <a:ext cx="0" cy="0"/>
+          <a:chOff x="0" y="0"/>
+          <a:chExt cx="0" cy="0"/>
+        </a:xfrm>
+      </p:grpSpPr>
+      <p:sp>
+        <p:nvSpPr>
+          <p:cNvPr id="2" name="Titel 1"/>
+          <p:cNvSpPr>
+            <a:spLocks noGrp="1"/>
+          </p:cNvSpPr>
+          <p:nvPr>
+            <p:ph type="title"/>
+          </p:nvPr>
+        </p:nvSpPr>
+        <p:spPr/>
+        <p:txBody>
+          <a:bodyPr/>
+          <a:lstStyle/>
+          <a:p>
+            <a:r>
+              <a:rPr lang="da-DK" dirty="0" smtClean="0"/>
+              <a:t>Kommandoer</a:t>
+            </a:r>
+            <a:endParaRPr lang="da-DK" dirty="0"/>
+          </a:p>
+        </p:txBody>
+      </p:sp>
+      <p:sp>
+        <p:nvSpPr>
+          <p:cNvPr id="3" name="Pladsholder til indhold 2"/>
+          <p:cNvSpPr>
+            <a:spLocks noGrp="1"/>
+          </p:cNvSpPr>
+          <p:nvPr>
+            <p:ph idx="1"/>
+          </p:nvPr>
+        </p:nvSpPr>
+        <p:spPr/>
+        <p:txBody>
+          <a:bodyPr>
+            <a:normAutofit/>
+          </a:bodyPr>
+          <a:lstStyle/>
+          <a:p>
+            <a:r>
+              <a:rPr lang="da-DK" dirty="0" smtClean="0"/>
+              <a:t>Attack</a:t>
+            </a:r>
+          </a:p>
+        </p:txBody>
+      </p:sp>
+      <p:pic>
+        <p:nvPicPr>
+          <p:cNvPr id="1026" name="Picture 2" descr="C:\Users\THL\Dropbox\Ting\attack.png"/>
+          <p:cNvPicPr>
+            <a:picLocks noChangeAspect="1" noChangeArrowheads="1"/>
+          </p:cNvPicPr>
+          <p:nvPr/>
+        </p:nvPicPr>
+        <p:blipFill>
+          <a:blip r:embed="rId2">
+            <a:extLst>
+              <a:ext uri="{28A0092B-C50C-407E-A947-70E740481C1C}">
+                <a14:useLocalDpi xmlns:a14="http://schemas.microsoft.com/office/drawing/2010/main" val="0"/>
+              </a:ext>
+            </a:extLst>
+          </a:blip>
+          <a:srcRect/>
+          <a:stretch>
+            <a:fillRect/>
+          </a:stretch>
+        </p:blipFill>
+        <p:spPr bwMode="auto">
+          <a:xfrm>
+            <a:off x="1365695" y="2492896"/>
+            <a:ext cx="6374658" cy="3228907"/>
+          </a:xfrm>
+          <a:prstGeom prst="rect">
+            <a:avLst/>
+          </a:prstGeom>
+          <a:noFill/>
+          <a:extLst>
+            <a:ext uri="{909E8E84-426E-40DD-AFC4-6F175D3DCCD1}">
+              <a14:hiddenFill xmlns:a14="http://schemas.microsoft.com/office/drawing/2010/main">
+                <a:solidFill>
+                  <a:srgbClr val="FFFFFF"/>
+                </a:solidFill>
+              </a14:hiddenFill>
+            </a:ext>
+          </a:extLst>
+        </p:spPr>
+      </p:pic>
+    </p:spTree>
+    <p:extLst>
+      <p:ext uri="{BB962C8B-B14F-4D97-AF65-F5344CB8AC3E}">
+        <p14:creationId xmlns:p14="http://schemas.microsoft.com/office/powerpoint/2010/main" val="2591322482"/>
+      </p:ext>
+    </p:extLst>
+  </p:cSld>
+  <p:clrMapOvr>
+    <a:masterClrMapping/>
+  </p:clrMapOvr>
+</p:sld>
+</file>
+
+<file path=ppt/slides/slide6.xml><?xml version="1.0" encoding="utf-8"?>
+<p:sld xmlns:a="http://schemas.openxmlformats.org/drawingml/2006/main" xmlns:r="http://schemas.openxmlformats.org/officeDocument/2006/relationships" xmlns:p="http://schemas.openxmlformats.org/presentationml/2006/main">
+  <p:cSld>
+    <p:spTree>
+      <p:nvGrpSpPr>
+        <p:cNvPr id="1" name=""/>
+        <p:cNvGrpSpPr/>
+        <p:nvPr/>
+      </p:nvGrpSpPr>
+      <p:grpSpPr>
+        <a:xfrm>
+          <a:off x="0" y="0"/>
+          <a:ext cx="0" cy="0"/>
+          <a:chOff x="0" y="0"/>
+          <a:chExt cx="0" cy="0"/>
+        </a:xfrm>
+      </p:grpSpPr>
+      <p:sp>
+        <p:nvSpPr>
+          <p:cNvPr id="2" name="Titel 1"/>
+          <p:cNvSpPr>
+            <a:spLocks noGrp="1"/>
+          </p:cNvSpPr>
+          <p:nvPr>
+            <p:ph type="title"/>
+          </p:nvPr>
+        </p:nvSpPr>
+        <p:spPr/>
+        <p:txBody>
+          <a:bodyPr/>
+          <a:lstStyle/>
+          <a:p>
+            <a:r>
+              <a:rPr lang="da-DK" dirty="0" smtClean="0"/>
+              <a:t>Kommandoer</a:t>
+            </a:r>
+            <a:endParaRPr lang="da-DK" dirty="0"/>
+          </a:p>
+        </p:txBody>
+      </p:sp>
+      <p:sp>
+        <p:nvSpPr>
+          <p:cNvPr id="3" name="Pladsholder til indhold 2"/>
+          <p:cNvSpPr>
+            <a:spLocks noGrp="1"/>
+          </p:cNvSpPr>
+          <p:nvPr>
+            <p:ph idx="1"/>
+          </p:nvPr>
+        </p:nvSpPr>
+        <p:spPr>
+          <a:xfrm>
+            <a:off x="457200" y="1600200"/>
+            <a:ext cx="8229600" cy="5257800"/>
+          </a:xfrm>
+        </p:spPr>
+        <p:txBody>
+          <a:bodyPr>
+            <a:normAutofit/>
+          </a:bodyPr>
+          <a:lstStyle/>
+          <a:p>
+            <a:r>
+              <a:rPr lang="da-DK" dirty="0" smtClean="0"/>
+              <a:t>Look</a:t>
+            </a:r>
+          </a:p>
+        </p:txBody>
+      </p:sp>
+      <p:pic>
+        <p:nvPicPr>
+          <p:cNvPr id="3074" name="Picture 2" descr="C:\Users\THL\Dropbox\Ting\look1.png"/>
+          <p:cNvPicPr>
+            <a:picLocks noChangeAspect="1" noChangeArrowheads="1"/>
+          </p:cNvPicPr>
+          <p:nvPr/>
+        </p:nvPicPr>
+        <p:blipFill>
+          <a:blip r:embed="rId2">
+            <a:extLst>
+              <a:ext uri="{28A0092B-C50C-407E-A947-70E740481C1C}">
+                <a14:useLocalDpi xmlns:a14="http://schemas.microsoft.com/office/drawing/2010/main" val="0"/>
+              </a:ext>
+            </a:extLst>
+          </a:blip>
+          <a:srcRect/>
+          <a:stretch>
+            <a:fillRect/>
+          </a:stretch>
+        </p:blipFill>
+        <p:spPr bwMode="auto">
+          <a:xfrm>
+            <a:off x="2531803" y="2276872"/>
+            <a:ext cx="4032448" cy="2042525"/>
+          </a:xfrm>
+          <a:prstGeom prst="rect">
+            <a:avLst/>
+          </a:prstGeom>
+          <a:noFill/>
+          <a:extLst>
+            <a:ext uri="{909E8E84-426E-40DD-AFC4-6F175D3DCCD1}">
+              <a14:hiddenFill xmlns:a14="http://schemas.microsoft.com/office/drawing/2010/main">
+                <a:solidFill>
+                  <a:srgbClr val="FFFFFF"/>
+                </a:solidFill>
+              </a14:hiddenFill>
+            </a:ext>
+          </a:extLst>
+        </p:spPr>
+      </p:pic>
+      <p:pic>
+        <p:nvPicPr>
+          <p:cNvPr id="3075" name="Picture 3" descr="C:\Users\THL\Dropbox\Ting\look2.png"/>
+          <p:cNvPicPr>
+            <a:picLocks noChangeAspect="1" noChangeArrowheads="1"/>
+          </p:cNvPicPr>
+          <p:nvPr/>
+        </p:nvPicPr>
+        <p:blipFill>
+          <a:blip r:embed="rId3">
+            <a:extLst>
+              <a:ext uri="{28A0092B-C50C-407E-A947-70E740481C1C}">
+                <a14:useLocalDpi xmlns:a14="http://schemas.microsoft.com/office/drawing/2010/main" val="0"/>
+              </a:ext>
+            </a:extLst>
+          </a:blip>
+          <a:srcRect/>
+          <a:stretch>
+            <a:fillRect/>
+          </a:stretch>
+        </p:blipFill>
+        <p:spPr bwMode="auto">
+          <a:xfrm>
+            <a:off x="2555776" y="4581128"/>
+            <a:ext cx="4019734" cy="2036085"/>
+          </a:xfrm>
+          <a:prstGeom prst="rect">
+            <a:avLst/>
+          </a:prstGeom>
+          <a:noFill/>
+          <a:extLst>
+            <a:ext uri="{909E8E84-426E-40DD-AFC4-6F175D3DCCD1}">
+              <a14:hiddenFill xmlns:a14="http://schemas.microsoft.com/office/drawing/2010/main">
+                <a:solidFill>
+                  <a:srgbClr val="FFFFFF"/>
+                </a:solidFill>
+              </a14:hiddenFill>
+            </a:ext>
+          </a:extLst>
+        </p:spPr>
+      </p:pic>
+    </p:spTree>
+    <p:extLst>
+      <p:ext uri="{BB962C8B-B14F-4D97-AF65-F5344CB8AC3E}">
+        <p14:creationId xmlns:p14="http://schemas.microsoft.com/office/powerpoint/2010/main" val="389079286"/>
+      </p:ext>
+    </p:extLst>
+  </p:cSld>
+  <p:clrMapOvr>
+    <a:masterClrMapping/>
+  </p:clrMapOvr>
+</p:sld>
+</file>
+
+<file path=ppt/slides/slide7.xml><?xml version="1.0" encoding="utf-8"?>
+<p:sld xmlns:a="http://schemas.openxmlformats.org/drawingml/2006/main" xmlns:r="http://schemas.openxmlformats.org/officeDocument/2006/relationships" xmlns:p="http://schemas.openxmlformats.org/presentationml/2006/main">
+  <p:cSld>
+    <p:spTree>
+      <p:nvGrpSpPr>
+        <p:cNvPr id="1" name=""/>
+        <p:cNvGrpSpPr/>
+        <p:nvPr/>
+      </p:nvGrpSpPr>
+      <p:grpSpPr>
+        <a:xfrm>
+          <a:off x="0" y="0"/>
+          <a:ext cx="0" cy="0"/>
+          <a:chOff x="0" y="0"/>
+          <a:chExt cx="0" cy="0"/>
+        </a:xfrm>
+      </p:grpSpPr>
+      <p:sp>
+        <p:nvSpPr>
+          <p:cNvPr id="2" name="Titel 1"/>
+          <p:cNvSpPr>
+            <a:spLocks noGrp="1"/>
+          </p:cNvSpPr>
+          <p:nvPr>
+            <p:ph type="title"/>
+          </p:nvPr>
+        </p:nvSpPr>
+        <p:spPr/>
+        <p:txBody>
+          <a:bodyPr/>
+          <a:lstStyle/>
+          <a:p>
+            <a:r>
+              <a:rPr lang="da-DK" dirty="0" smtClean="0"/>
+              <a:t>Kommandoer</a:t>
+            </a:r>
+            <a:endParaRPr lang="da-DK" dirty="0"/>
+          </a:p>
+        </p:txBody>
+      </p:sp>
+      <p:sp>
+        <p:nvSpPr>
+          <p:cNvPr id="3" name="Pladsholder til indhold 2"/>
+          <p:cNvSpPr>
+            <a:spLocks noGrp="1"/>
+          </p:cNvSpPr>
+          <p:nvPr>
+            <p:ph idx="1"/>
+          </p:nvPr>
+        </p:nvSpPr>
+        <p:spPr/>
+        <p:txBody>
+          <a:bodyPr>
+            <a:normAutofit/>
+          </a:bodyPr>
+          <a:lstStyle/>
+          <a:p>
+            <a:r>
+              <a:rPr lang="da-DK" dirty="0" smtClean="0"/>
+              <a:t>Search</a:t>
+            </a:r>
+          </a:p>
+        </p:txBody>
+      </p:sp>
+      <p:pic>
+        <p:nvPicPr>
+          <p:cNvPr id="4098" name="Picture 2" descr="C:\Users\THL\Dropbox\Ting\search1.png"/>
+          <p:cNvPicPr>
+            <a:picLocks noChangeAspect="1" noChangeArrowheads="1"/>
+          </p:cNvPicPr>
+          <p:nvPr/>
+        </p:nvPicPr>
+        <p:blipFill>
+          <a:blip r:embed="rId2">
+            <a:extLst>
+              <a:ext uri="{28A0092B-C50C-407E-A947-70E740481C1C}">
+                <a14:useLocalDpi xmlns:a14="http://schemas.microsoft.com/office/drawing/2010/main" val="0"/>
+              </a:ext>
+            </a:extLst>
+          </a:blip>
+          <a:srcRect/>
+          <a:stretch>
+            <a:fillRect/>
+          </a:stretch>
+        </p:blipFill>
+        <p:spPr bwMode="auto">
+          <a:xfrm>
+            <a:off x="2409491" y="2132856"/>
+            <a:ext cx="4122684" cy="2088232"/>
+          </a:xfrm>
+          <a:prstGeom prst="rect">
+            <a:avLst/>
+          </a:prstGeom>
+          <a:noFill/>
+          <a:extLst>
+            <a:ext uri="{909E8E84-426E-40DD-AFC4-6F175D3DCCD1}">
+              <a14:hiddenFill xmlns:a14="http://schemas.microsoft.com/office/drawing/2010/main">
+                <a:solidFill>
+                  <a:srgbClr val="FFFFFF"/>
+                </a:solidFill>
+              </a14:hiddenFill>
+            </a:ext>
+          </a:extLst>
+        </p:spPr>
+      </p:pic>
+      <p:pic>
+        <p:nvPicPr>
+          <p:cNvPr id="4099" name="Picture 3" descr="C:\Users\THL\Dropbox\Ting\search2.png"/>
+          <p:cNvPicPr>
+            <a:picLocks noChangeAspect="1" noChangeArrowheads="1"/>
+          </p:cNvPicPr>
+          <p:nvPr/>
+        </p:nvPicPr>
+        <p:blipFill>
+          <a:blip r:embed="rId3">
+            <a:extLst>
+              <a:ext uri="{28A0092B-C50C-407E-A947-70E740481C1C}">
+                <a14:useLocalDpi xmlns:a14="http://schemas.microsoft.com/office/drawing/2010/main" val="0"/>
+              </a:ext>
+            </a:extLst>
+          </a:blip>
+          <a:srcRect/>
+          <a:stretch>
+            <a:fillRect/>
+          </a:stretch>
+        </p:blipFill>
+        <p:spPr bwMode="auto">
+          <a:xfrm>
+            <a:off x="2411760" y="4365104"/>
+            <a:ext cx="4122685" cy="2088232"/>
+          </a:xfrm>
+          <a:prstGeom prst="rect">
+            <a:avLst/>
+          </a:prstGeom>
+          <a:noFill/>
+          <a:extLst>
+            <a:ext uri="{909E8E84-426E-40DD-AFC4-6F175D3DCCD1}">
+              <a14:hiddenFill xmlns:a14="http://schemas.microsoft.com/office/drawing/2010/main">
+                <a:solidFill>
+                  <a:srgbClr val="FFFFFF"/>
+                </a:solidFill>
+              </a14:hiddenFill>
+            </a:ext>
+          </a:extLst>
+        </p:spPr>
+      </p:pic>
+    </p:spTree>
+    <p:extLst>
+      <p:ext uri="{BB962C8B-B14F-4D97-AF65-F5344CB8AC3E}">
+        <p14:creationId xmlns:p14="http://schemas.microsoft.com/office/powerpoint/2010/main" val="376874439"/>
+      </p:ext>
+    </p:extLst>
+  </p:cSld>
+  <p:clrMapOvr>
+    <a:masterClrMapping/>
+  </p:clrMapOvr>
+</p:sld>
+</file>
+
+<file path=ppt/slides/slide8.xml><?xml version="1.0" encoding="utf-8"?>
+<p:sld xmlns:a="http://schemas.openxmlformats.org/drawingml/2006/main" xmlns:r="http://schemas.openxmlformats.org/officeDocument/2006/relationships" xmlns:p="http://schemas.openxmlformats.org/presentationml/2006/main">
+  <p:cSld>
+    <p:spTree>
+      <p:nvGrpSpPr>
+        <p:cNvPr id="1" name=""/>
+        <p:cNvGrpSpPr/>
+        <p:nvPr/>
+      </p:nvGrpSpPr>
+      <p:grpSpPr>
+        <a:xfrm>
+          <a:off x="0" y="0"/>
+          <a:ext cx="0" cy="0"/>
+          <a:chOff x="0" y="0"/>
+          <a:chExt cx="0" cy="0"/>
+        </a:xfrm>
+      </p:grpSpPr>
+      <p:sp>
+        <p:nvSpPr>
+          <p:cNvPr id="2" name="Titel 1"/>
+          <p:cNvSpPr>
+            <a:spLocks noGrp="1"/>
+          </p:cNvSpPr>
+          <p:nvPr>
+            <p:ph type="title"/>
+          </p:nvPr>
+        </p:nvSpPr>
+        <p:spPr/>
+        <p:txBody>
+          <a:bodyPr/>
+          <a:lstStyle/>
+          <a:p>
+            <a:r>
+              <a:rPr lang="da-DK" dirty="0" smtClean="0"/>
+              <a:t>Kommandoer</a:t>
+            </a:r>
+            <a:endParaRPr lang="da-DK" dirty="0"/>
+          </a:p>
+        </p:txBody>
+      </p:sp>
+      <p:sp>
+        <p:nvSpPr>
+          <p:cNvPr id="3" name="Pladsholder til indhold 2"/>
+          <p:cNvSpPr>
+            <a:spLocks noGrp="1"/>
+          </p:cNvSpPr>
+          <p:nvPr>
+            <p:ph idx="1"/>
+          </p:nvPr>
+        </p:nvSpPr>
+        <p:spPr/>
+        <p:txBody>
+          <a:bodyPr>
+            <a:normAutofit/>
+          </a:bodyPr>
+          <a:lstStyle/>
+          <a:p>
+            <a:r>
+              <a:rPr lang="da-DK" dirty="0" err="1" smtClean="0"/>
+              <a:t>Use</a:t>
+            </a:r>
+            <a:endParaRPr lang="da-DK" dirty="0" smtClean="0"/>
+          </a:p>
+          <a:p>
+            <a:pPr lvl="1"/>
+            <a:endParaRPr lang="da-DK" dirty="0" smtClean="0"/>
+          </a:p>
+        </p:txBody>
+      </p:sp>
+      <p:pic>
+        <p:nvPicPr>
+          <p:cNvPr id="6147" name="Picture 3" descr="C:\Users\THL\Dropbox\Ting\use.png"/>
+          <p:cNvPicPr>
+            <a:picLocks noChangeAspect="1" noChangeArrowheads="1"/>
+          </p:cNvPicPr>
+          <p:nvPr/>
+        </p:nvPicPr>
+        <p:blipFill>
+          <a:blip r:embed="rId2">
+            <a:extLst>
+              <a:ext uri="{28A0092B-C50C-407E-A947-70E740481C1C}">
+                <a14:useLocalDpi xmlns:a14="http://schemas.microsoft.com/office/drawing/2010/main" val="0"/>
+              </a:ext>
+            </a:extLst>
+          </a:blip>
+          <a:srcRect/>
+          <a:stretch>
+            <a:fillRect/>
+          </a:stretch>
+        </p:blipFill>
+        <p:spPr bwMode="auto">
+          <a:xfrm>
+            <a:off x="1525145" y="2478906"/>
+            <a:ext cx="6450013" cy="3267075"/>
+          </a:xfrm>
+          <a:prstGeom prst="rect">
+            <a:avLst/>
+          </a:prstGeom>
+          <a:noFill/>
+          <a:extLst>
+            <a:ext uri="{909E8E84-426E-40DD-AFC4-6F175D3DCCD1}">
+              <a14:hiddenFill xmlns:a14="http://schemas.microsoft.com/office/drawing/2010/main">
+                <a:solidFill>
+                  <a:srgbClr val="FFFFFF"/>
+                </a:solidFill>
+              </a14:hiddenFill>
+            </a:ext>
+          </a:extLst>
+        </p:spPr>
+      </p:pic>
+    </p:spTree>
+    <p:extLst>
+      <p:ext uri="{BB962C8B-B14F-4D97-AF65-F5344CB8AC3E}">
+        <p14:creationId xmlns:p14="http://schemas.microsoft.com/office/powerpoint/2010/main" val="3585499984"/>
+      </p:ext>
+    </p:extLst>
+  </p:cSld>
+  <p:clrMapOvr>
+    <a:masterClrMapping/>
+  </p:clrMapOvr>
+</p:sld>
+</file>
+
+<file path=ppt/slides/slide9.xml><?xml version="1.0" encoding="utf-8"?>
+<p:sld xmlns:a="http://schemas.openxmlformats.org/drawingml/2006/main" xmlns:r="http://schemas.openxmlformats.org/officeDocument/2006/relationships" xmlns:p="http://schemas.openxmlformats.org/presentationml/2006/main">
+  <p:cSld>
+    <p:spTree>
+      <p:nvGrpSpPr>
+        <p:cNvPr id="1" name=""/>
+        <p:cNvGrpSpPr/>
+        <p:nvPr/>
+      </p:nvGrpSpPr>
+      <p:grpSpPr>
+        <a:xfrm>
+          <a:off x="0" y="0"/>
+          <a:ext cx="0" cy="0"/>
+          <a:chOff x="0" y="0"/>
+          <a:chExt cx="0" cy="0"/>
+        </a:xfrm>
+      </p:grpSpPr>
+      <p:sp>
+        <p:nvSpPr>
+          <p:cNvPr id="2" name="Titel 1"/>
+          <p:cNvSpPr>
+            <a:spLocks noGrp="1"/>
+          </p:cNvSpPr>
+          <p:nvPr>
+            <p:ph type="title"/>
+          </p:nvPr>
+        </p:nvSpPr>
+        <p:spPr/>
+        <p:txBody>
+          <a:bodyPr/>
+          <a:lstStyle/>
+          <a:p>
+            <a:r>
+              <a:rPr lang="da-DK" dirty="0" smtClean="0"/>
+              <a:t>Kommandoer</a:t>
+            </a:r>
+            <a:endParaRPr lang="da-DK" dirty="0"/>
+          </a:p>
+        </p:txBody>
+      </p:sp>
+      <p:sp>
+        <p:nvSpPr>
+          <p:cNvPr id="3" name="Pladsholder til indhold 2"/>
+          <p:cNvSpPr>
+            <a:spLocks noGrp="1"/>
+          </p:cNvSpPr>
+          <p:nvPr>
+            <p:ph idx="1"/>
+          </p:nvPr>
+        </p:nvSpPr>
+        <p:spPr/>
+        <p:txBody>
+          <a:bodyPr>
+            <a:normAutofit/>
+          </a:bodyPr>
+          <a:lstStyle/>
+          <a:p>
+            <a:r>
+              <a:rPr lang="da-DK" dirty="0" smtClean="0"/>
+              <a:t>Gear</a:t>
+            </a:r>
+          </a:p>
+          <a:p>
+            <a:pPr lvl="1"/>
+            <a:endParaRPr lang="da-DK" dirty="0" smtClean="0"/>
+          </a:p>
+        </p:txBody>
+      </p:sp>
+      <p:pic>
+        <p:nvPicPr>
+          <p:cNvPr id="7170" name="Picture 2" descr="C:\Users\THL\Dropbox\Ting\gear.png"/>
+          <p:cNvPicPr>
+            <a:picLocks noChangeAspect="1" noChangeArrowheads="1"/>
+          </p:cNvPicPr>
+          <p:nvPr/>
+        </p:nvPicPr>
+        <p:blipFill>
+          <a:blip r:embed="rId2">
+            <a:extLst>
+              <a:ext uri="{28A0092B-C50C-407E-A947-70E740481C1C}">
+                <a14:useLocalDpi xmlns:a14="http://schemas.microsoft.com/office/drawing/2010/main" val="0"/>
+              </a:ext>
+            </a:extLst>
+          </a:blip>
+          <a:srcRect/>
+          <a:stretch>
+            <a:fillRect/>
+          </a:stretch>
+        </p:blipFill>
+        <p:spPr bwMode="auto">
+          <a:xfrm>
+            <a:off x="1300495" y="2420888"/>
+            <a:ext cx="6450013" cy="3267075"/>
+          </a:xfrm>
+          <a:prstGeom prst="rect">
+            <a:avLst/>
+          </a:prstGeom>
+          <a:noFill/>
+          <a:extLst>
+            <a:ext uri="{909E8E84-426E-40DD-AFC4-6F175D3DCCD1}">
+              <a14:hiddenFill xmlns:a14="http://schemas.microsoft.com/office/drawing/2010/main">
+                <a:solidFill>
+                  <a:srgbClr val="FFFFFF"/>
+                </a:solidFill>
+              </a14:hiddenFill>
+            </a:ext>
+          </a:extLst>
+        </p:spPr>
+      </p:pic>
+    </p:spTree>
+    <p:extLst>
+      <p:ext uri="{BB962C8B-B14F-4D97-AF65-F5344CB8AC3E}">
+        <p14:creationId xmlns:p14="http://schemas.microsoft.com/office/powerpoint/2010/main" val="3876004139"/>
       </p:ext>
     </p:extLst>
   </p:cSld>

</xml_diff>